<commit_message>
java-project-template: Updated pptx file.
</commit_message>
<xml_diff>
--- a/resources/Spring framework.pptx
+++ b/resources/Spring framework.pptx
@@ -18,18 +18,20 @@
     <p:sldId id="266" r:id="rId12"/>
     <p:sldId id="267" r:id="rId13"/>
     <p:sldId id="268" r:id="rId14"/>
-    <p:sldId id="270" r:id="rId15"/>
-    <p:sldId id="269" r:id="rId16"/>
-    <p:sldId id="271" r:id="rId17"/>
-    <p:sldId id="272" r:id="rId18"/>
-    <p:sldId id="273" r:id="rId19"/>
-    <p:sldId id="274" r:id="rId20"/>
-    <p:sldId id="275" r:id="rId21"/>
-    <p:sldId id="276" r:id="rId22"/>
-    <p:sldId id="278" r:id="rId23"/>
-    <p:sldId id="279" r:id="rId24"/>
-    <p:sldId id="277" r:id="rId25"/>
-    <p:sldId id="280" r:id="rId26"/>
+    <p:sldId id="281" r:id="rId15"/>
+    <p:sldId id="282" r:id="rId16"/>
+    <p:sldId id="270" r:id="rId17"/>
+    <p:sldId id="269" r:id="rId18"/>
+    <p:sldId id="271" r:id="rId19"/>
+    <p:sldId id="272" r:id="rId20"/>
+    <p:sldId id="273" r:id="rId21"/>
+    <p:sldId id="274" r:id="rId22"/>
+    <p:sldId id="275" r:id="rId23"/>
+    <p:sldId id="276" r:id="rId24"/>
+    <p:sldId id="278" r:id="rId25"/>
+    <p:sldId id="279" r:id="rId26"/>
+    <p:sldId id="277" r:id="rId27"/>
+    <p:sldId id="280" r:id="rId28"/>
   </p:sldIdLst>
   <p:sldSz cx="12192000" cy="6858000"/>
   <p:notesSz cx="6858000" cy="9144000"/>
@@ -128,6 +130,11 @@
       </a:defRPr>
     </a:lvl9pPr>
   </p:defaultTextStyle>
+  <p:extLst>
+    <p:ext uri="{EFAFB233-063F-42B5-8137-9DF3F51BA10A}">
+      <p15:sldGuideLst xmlns:p15="http://schemas.microsoft.com/office/powerpoint/2012/main"/>
+    </p:ext>
+  </p:extLst>
 </p:presentation>
 </file>
 
@@ -534,7 +541,7 @@
           <a:p>
             <a:fld id="{83284890-85D2-4D7B-8EF5-15A9C1DB8F42}" type="datetimeFigureOut">
               <a:rPr lang="en-US" dirty="0"/>
-              <a:t>10/17/2019</a:t>
+              <a:t>3/13/2020</a:t>
             </a:fld>
             <a:endParaRPr lang="en-US" dirty="0"/>
           </a:p>
@@ -709,7 +716,7 @@
           <a:p>
             <a:fld id="{87157CC2-0FC8-4686-B024-99790E0F5162}" type="datetimeFigureOut">
               <a:rPr lang="en-US" dirty="0"/>
-              <a:t>10/17/2019</a:t>
+              <a:t>3/13/2020</a:t>
             </a:fld>
             <a:endParaRPr lang="en-US" dirty="0"/>
           </a:p>
@@ -884,7 +891,7 @@
           <a:p>
             <a:fld id="{F6764DA5-CD3D-4590-A511-FCD3BC7A793E}" type="datetimeFigureOut">
               <a:rPr lang="en-US" dirty="0"/>
-              <a:t>10/17/2019</a:t>
+              <a:t>3/13/2020</a:t>
             </a:fld>
             <a:endParaRPr lang="en-US" dirty="0"/>
           </a:p>
@@ -1049,7 +1056,7 @@
           <a:p>
             <a:fld id="{82F5661D-6934-4B32-B92C-470368BF1EC6}" type="datetimeFigureOut">
               <a:rPr lang="en-US" dirty="0"/>
-              <a:t>10/17/2019</a:t>
+              <a:t>3/13/2020</a:t>
             </a:fld>
             <a:endParaRPr lang="en-US" dirty="0"/>
           </a:p>
@@ -1357,7 +1364,7 @@
           <a:p>
             <a:fld id="{C6F822A4-8DA6-4447-9B1F-C5DB58435268}" type="datetimeFigureOut">
               <a:rPr lang="en-US" dirty="0"/>
-              <a:t>10/17/2019</a:t>
+              <a:t>3/13/2020</a:t>
             </a:fld>
             <a:endParaRPr lang="en-US" dirty="0"/>
           </a:p>
@@ -1739,7 +1746,7 @@
           <a:p>
             <a:fld id="{E548D31E-DCDA-41A7-9C67-C4B11B94D21D}" type="datetimeFigureOut">
               <a:rPr lang="en-US" dirty="0"/>
-              <a:t>10/17/2019</a:t>
+              <a:t>3/13/2020</a:t>
             </a:fld>
             <a:endParaRPr lang="en-US" dirty="0"/>
           </a:p>
@@ -2168,7 +2175,7 @@
           <a:p>
             <a:fld id="{9B3762C0-B258-48F1-ADE6-176B4174CCDD}" type="datetimeFigureOut">
               <a:rPr lang="en-US" dirty="0"/>
-              <a:t>10/17/2019</a:t>
+              <a:t>3/13/2020</a:t>
             </a:fld>
             <a:endParaRPr lang="en-US" dirty="0"/>
           </a:p>
@@ -2281,7 +2288,7 @@
           <a:p>
             <a:fld id="{677919A6-33EB-49BD-A62F-1FA56B9F9712}" type="datetimeFigureOut">
               <a:rPr lang="en-US" dirty="0"/>
-              <a:t>10/17/2019</a:t>
+              <a:t>3/13/2020</a:t>
             </a:fld>
             <a:endParaRPr lang="en-US" dirty="0"/>
           </a:p>
@@ -2371,7 +2378,7 @@
           <a:p>
             <a:fld id="{CA4E7D1B-D673-4CF6-8672-009D42ABD2A0}" type="datetimeFigureOut">
               <a:rPr lang="en-US" dirty="0"/>
-              <a:t>10/17/2019</a:t>
+              <a:t>3/13/2020</a:t>
             </a:fld>
             <a:endParaRPr lang="en-US" dirty="0"/>
           </a:p>
@@ -2716,7 +2723,7 @@
           <a:p>
             <a:fld id="{DA16AA21-1863-4931-97CB-99D0A168701B}" type="datetimeFigureOut">
               <a:rPr lang="en-US" dirty="0"/>
-              <a:t>10/17/2019</a:t>
+              <a:t>3/13/2020</a:t>
             </a:fld>
             <a:endParaRPr lang="en-US" dirty="0"/>
           </a:p>
@@ -3136,7 +3143,7 @@
           <a:p>
             <a:fld id="{3772C379-9A7C-4C87-A116-CBE9F58B04C5}" type="datetimeFigureOut">
               <a:rPr lang="en-US" dirty="0"/>
-              <a:t>10/17/2019</a:t>
+              <a:t>3/13/2020</a:t>
             </a:fld>
             <a:endParaRPr lang="en-US" dirty="0"/>
           </a:p>
@@ -3412,7 +3419,7 @@
           <a:p>
             <a:fld id="{8664C608-40B1-4030-A28D-5B74BC98ADCE}" type="datetimeFigureOut">
               <a:rPr lang="en-US" dirty="0"/>
-              <a:t>10/17/2019</a:t>
+              <a:t>3/13/2020</a:t>
             </a:fld>
             <a:endParaRPr lang="en-US" dirty="0"/>
           </a:p>
@@ -4443,63 +4450,7 @@
           <a:p>
             <a:r>
               <a:rPr lang="en-US" dirty="0" smtClean="0"/>
-              <a:t>Spring boot </a:t>
-            </a:r>
-            <a:r>
-              <a:rPr lang="en-US" dirty="0" err="1" smtClean="0"/>
-              <a:t>primeros</a:t>
-            </a:r>
-            <a:r>
-              <a:rPr lang="en-US" dirty="0" smtClean="0"/>
-              <a:t> </a:t>
-            </a:r>
-            <a:r>
-              <a:rPr lang="en-US" dirty="0" err="1" smtClean="0"/>
-              <a:t>pasos</a:t>
-            </a:r>
-            <a:endParaRPr lang="en-US" dirty="0"/>
-          </a:p>
-        </p:txBody>
-      </p:sp>
-      <p:sp>
-        <p:nvSpPr>
-          <p:cNvPr id="3" name="Marcador de contenido 2"/>
-          <p:cNvSpPr>
-            <a:spLocks noGrp="1"/>
-          </p:cNvSpPr>
-          <p:nvPr>
-            <p:ph idx="1"/>
-          </p:nvPr>
-        </p:nvSpPr>
-        <p:spPr/>
-        <p:txBody>
-          <a:bodyPr/>
-          <a:lstStyle/>
-          <a:p>
-            <a:r>
-              <a:rPr lang="en-US" dirty="0" smtClean="0"/>
-              <a:t>Rest </a:t>
-            </a:r>
-            <a:r>
-              <a:rPr lang="en-US" dirty="0" err="1" smtClean="0"/>
-              <a:t>EndPoints</a:t>
-            </a:r>
-            <a:endParaRPr lang="en-US" dirty="0" smtClean="0"/>
-          </a:p>
-          <a:p>
-            <a:r>
-              <a:rPr lang="en-US" dirty="0" err="1" smtClean="0"/>
-              <a:t>Ejemplo</a:t>
-            </a:r>
-            <a:r>
-              <a:rPr lang="en-US" dirty="0" smtClean="0"/>
-              <a:t>: Google Drive API </a:t>
-            </a:r>
-            <a:r>
-              <a:rPr lang="en-US" dirty="0">
-                <a:hlinkClick r:id="rId2"/>
-              </a:rPr>
-              <a:t>https://developers.google.com/drive/api/v3/reference</a:t>
+              <a:t>ESTRUCTURA DE UN PROYECTO</a:t>
             </a:r>
             <a:endParaRPr lang="en-US" dirty="0"/>
           </a:p>
@@ -4507,22 +4458,22 @@
       </p:sp>
       <p:pic>
         <p:nvPicPr>
-          <p:cNvPr id="4" name="Imagen 3"/>
+          <p:cNvPr id="5" name="Imagen 4"/>
           <p:cNvPicPr>
             <a:picLocks noChangeAspect="1"/>
           </p:cNvPicPr>
           <p:nvPr/>
         </p:nvPicPr>
         <p:blipFill>
-          <a:blip r:embed="rId3"/>
+          <a:blip r:embed="rId2"/>
           <a:stretch>
             <a:fillRect/>
           </a:stretch>
         </p:blipFill>
         <p:spPr>
           <a:xfrm>
-            <a:off x="1382684" y="3514725"/>
-            <a:ext cx="8229600" cy="3343275"/>
+            <a:off x="2414587" y="2093976"/>
+            <a:ext cx="6448425" cy="4276725"/>
           </a:xfrm>
           <a:prstGeom prst="rect">
             <a:avLst/>
@@ -4532,7 +4483,7 @@
     </p:spTree>
     <p:extLst>
       <p:ext uri="{BB962C8B-B14F-4D97-AF65-F5344CB8AC3E}">
-        <p14:creationId xmlns:p14="http://schemas.microsoft.com/office/powerpoint/2010/main" val="1085388330"/>
+        <p14:creationId xmlns:p14="http://schemas.microsoft.com/office/powerpoint/2010/main" val="3461384825"/>
       </p:ext>
     </p:extLst>
   </p:cSld>
@@ -4569,25 +4520,14 @@
             <p:ph type="title"/>
           </p:nvPr>
         </p:nvSpPr>
-        <p:spPr>
-          <a:xfrm>
-            <a:off x="1069847" y="333128"/>
-            <a:ext cx="10058400" cy="822129"/>
-          </a:xfrm>
-        </p:spPr>
-        <p:txBody>
-          <a:bodyPr>
-            <a:normAutofit fontScale="90000"/>
-          </a:bodyPr>
-          <a:lstStyle/>
-          <a:p>
-            <a:r>
-              <a:rPr lang="en-US" dirty="0" smtClean="0"/>
-              <a:t>Spring boot </a:t>
-            </a:r>
+        <p:spPr/>
+        <p:txBody>
+          <a:bodyPr/>
+          <a:lstStyle/>
+          <a:p>
             <a:r>
               <a:rPr lang="en-US" dirty="0" err="1" smtClean="0"/>
-              <a:t>primeros</a:t>
+              <a:t>Requisitos</a:t>
             </a:r>
             <a:r>
               <a:rPr lang="en-US" dirty="0" smtClean="0"/>
@@ -4595,7 +4535,78 @@
             </a:r>
             <a:r>
               <a:rPr lang="en-US" dirty="0" err="1" smtClean="0"/>
-              <a:t>pasos</a:t>
+              <a:t>necesarios</a:t>
+            </a:r>
+            <a:endParaRPr lang="en-US" dirty="0"/>
+          </a:p>
+        </p:txBody>
+      </p:sp>
+      <p:sp>
+        <p:nvSpPr>
+          <p:cNvPr id="3" name="Marcador de contenido 2"/>
+          <p:cNvSpPr>
+            <a:spLocks noGrp="1"/>
+          </p:cNvSpPr>
+          <p:nvPr>
+            <p:ph idx="1"/>
+          </p:nvPr>
+        </p:nvSpPr>
+        <p:spPr/>
+        <p:txBody>
+          <a:bodyPr/>
+          <a:lstStyle/>
+          <a:p>
+            <a:r>
+              <a:rPr lang="en-US" dirty="0" smtClean="0"/>
+              <a:t>Interface</a:t>
+            </a:r>
+          </a:p>
+          <a:p>
+            <a:r>
+              <a:rPr lang="en-US" dirty="0" err="1" smtClean="0"/>
+              <a:t>Clase</a:t>
+            </a:r>
+            <a:r>
+              <a:rPr lang="en-US" dirty="0" smtClean="0"/>
+              <a:t> </a:t>
+            </a:r>
+            <a:r>
+              <a:rPr lang="en-US" dirty="0" err="1" smtClean="0"/>
+              <a:t>Abstracta</a:t>
+            </a:r>
+            <a:endParaRPr lang="en-US" dirty="0" smtClean="0"/>
+          </a:p>
+          <a:p>
+            <a:r>
+              <a:rPr lang="en-US" dirty="0" err="1" smtClean="0"/>
+              <a:t>Inmutabilidad</a:t>
+            </a:r>
+            <a:endParaRPr lang="en-US" dirty="0" smtClean="0"/>
+          </a:p>
+          <a:p>
+            <a:r>
+              <a:rPr lang="en-US" dirty="0" smtClean="0"/>
+              <a:t>SOLID</a:t>
+            </a:r>
+          </a:p>
+          <a:p>
+            <a:r>
+              <a:rPr lang="en-US" dirty="0" smtClean="0"/>
+              <a:t>Dependency Injection</a:t>
+            </a:r>
+          </a:p>
+          <a:p>
+            <a:r>
+              <a:rPr lang="en-US" dirty="0" smtClean="0"/>
+              <a:t>Inverse of Control (</a:t>
+            </a:r>
+            <a:r>
+              <a:rPr lang="en-US" dirty="0" err="1" smtClean="0"/>
+              <a:t>IoC</a:t>
+            </a:r>
+            <a:r>
+              <a:rPr lang="en-US" dirty="0" smtClean="0"/>
+              <a:t>)</a:t>
             </a:r>
             <a:endParaRPr lang="en-US" dirty="0"/>
           </a:p>
@@ -4609,15 +4620,64 @@
           </p:cNvPicPr>
           <p:nvPr/>
         </p:nvPicPr>
-        <p:blipFill rotWithShape="1">
+        <p:blipFill>
           <a:blip r:embed="rId2"/>
-          <a:srcRect b="23931"/>
-          <a:stretch/>
+          <a:stretch>
+            <a:fillRect/>
+          </a:stretch>
         </p:blipFill>
         <p:spPr>
           <a:xfrm>
-            <a:off x="2488750" y="1155257"/>
-            <a:ext cx="7220595" cy="5594677"/>
+            <a:off x="5536276" y="1800289"/>
+            <a:ext cx="1909156" cy="2461021"/>
+          </a:xfrm>
+          <a:prstGeom prst="rect">
+            <a:avLst/>
+          </a:prstGeom>
+        </p:spPr>
+      </p:pic>
+      <p:pic>
+        <p:nvPicPr>
+          <p:cNvPr id="5" name="Imagen 4"/>
+          <p:cNvPicPr>
+            <a:picLocks noChangeAspect="1"/>
+          </p:cNvPicPr>
+          <p:nvPr/>
+        </p:nvPicPr>
+        <p:blipFill>
+          <a:blip r:embed="rId3"/>
+          <a:stretch>
+            <a:fillRect/>
+          </a:stretch>
+        </p:blipFill>
+        <p:spPr>
+          <a:xfrm>
+            <a:off x="7556355" y="1800289"/>
+            <a:ext cx="2128029" cy="2461021"/>
+          </a:xfrm>
+          <a:prstGeom prst="rect">
+            <a:avLst/>
+          </a:prstGeom>
+        </p:spPr>
+      </p:pic>
+      <p:pic>
+        <p:nvPicPr>
+          <p:cNvPr id="6" name="Imagen 5"/>
+          <p:cNvPicPr>
+            <a:picLocks noChangeAspect="1"/>
+          </p:cNvPicPr>
+          <p:nvPr/>
+        </p:nvPicPr>
+        <p:blipFill>
+          <a:blip r:embed="rId4"/>
+          <a:stretch>
+            <a:fillRect/>
+          </a:stretch>
+        </p:blipFill>
+        <p:spPr>
+          <a:xfrm>
+            <a:off x="9795308" y="1800290"/>
+            <a:ext cx="1643006" cy="2454730"/>
           </a:xfrm>
           <a:prstGeom prst="rect">
             <a:avLst/>
@@ -4627,7 +4687,7 @@
     </p:spTree>
     <p:extLst>
       <p:ext uri="{BB962C8B-B14F-4D97-AF65-F5344CB8AC3E}">
-        <p14:creationId xmlns:p14="http://schemas.microsoft.com/office/powerpoint/2010/main" val="3406918157"/>
+        <p14:creationId xmlns:p14="http://schemas.microsoft.com/office/powerpoint/2010/main" val="2596304299"/>
       </p:ext>
     </p:extLst>
   </p:cSld>
@@ -4664,12 +4724,7 @@
             <p:ph type="title"/>
           </p:nvPr>
         </p:nvSpPr>
-        <p:spPr>
-          <a:xfrm>
-            <a:off x="945157" y="149391"/>
-            <a:ext cx="10058400" cy="905256"/>
-          </a:xfrm>
-        </p:spPr>
+        <p:spPr/>
         <p:txBody>
           <a:bodyPr/>
           <a:lstStyle/>
@@ -4689,6 +4744,50 @@
             <a:r>
               <a:rPr lang="en-US" dirty="0" err="1" smtClean="0"/>
               <a:t>pasos</a:t>
+            </a:r>
+            <a:endParaRPr lang="en-US" dirty="0"/>
+          </a:p>
+        </p:txBody>
+      </p:sp>
+      <p:sp>
+        <p:nvSpPr>
+          <p:cNvPr id="3" name="Marcador de contenido 2"/>
+          <p:cNvSpPr>
+            <a:spLocks noGrp="1"/>
+          </p:cNvSpPr>
+          <p:nvPr>
+            <p:ph idx="1"/>
+          </p:nvPr>
+        </p:nvSpPr>
+        <p:spPr/>
+        <p:txBody>
+          <a:bodyPr/>
+          <a:lstStyle/>
+          <a:p>
+            <a:r>
+              <a:rPr lang="en-US" dirty="0" smtClean="0"/>
+              <a:t>Rest </a:t>
+            </a:r>
+            <a:r>
+              <a:rPr lang="en-US" dirty="0" err="1" smtClean="0"/>
+              <a:t>EndPoints</a:t>
+            </a:r>
+            <a:endParaRPr lang="en-US" dirty="0" smtClean="0"/>
+          </a:p>
+          <a:p>
+            <a:r>
+              <a:rPr lang="en-US" dirty="0" err="1" smtClean="0"/>
+              <a:t>Ejemplo</a:t>
+            </a:r>
+            <a:r>
+              <a:rPr lang="en-US" dirty="0" smtClean="0"/>
+              <a:t>: Google Drive API </a:t>
+            </a:r>
+            <a:r>
+              <a:rPr lang="en-US" dirty="0">
+                <a:hlinkClick r:id="rId2"/>
+              </a:rPr>
+              <a:t>https://developers.google.com/drive/api/v3/reference</a:t>
             </a:r>
             <a:endParaRPr lang="en-US" dirty="0"/>
           </a:p>
@@ -4703,15 +4802,15 @@
           <p:nvPr/>
         </p:nvPicPr>
         <p:blipFill>
-          <a:blip r:embed="rId2"/>
+          <a:blip r:embed="rId3"/>
           <a:stretch>
             <a:fillRect/>
           </a:stretch>
         </p:blipFill>
         <p:spPr>
           <a:xfrm>
-            <a:off x="39070" y="1054647"/>
-            <a:ext cx="12119956" cy="5803353"/>
+            <a:off x="1382684" y="3514725"/>
+            <a:ext cx="8229600" cy="3343275"/>
           </a:xfrm>
           <a:prstGeom prst="rect">
             <a:avLst/>
@@ -4721,7 +4820,7 @@
     </p:spTree>
     <p:extLst>
       <p:ext uri="{BB962C8B-B14F-4D97-AF65-F5344CB8AC3E}">
-        <p14:creationId xmlns:p14="http://schemas.microsoft.com/office/powerpoint/2010/main" val="511193436"/>
+        <p14:creationId xmlns:p14="http://schemas.microsoft.com/office/powerpoint/2010/main" val="1085388330"/>
       </p:ext>
     </p:extLst>
   </p:cSld>
@@ -4758,6 +4857,195 @@
             <p:ph type="title"/>
           </p:nvPr>
         </p:nvSpPr>
+        <p:spPr>
+          <a:xfrm>
+            <a:off x="1069847" y="333128"/>
+            <a:ext cx="10058400" cy="822129"/>
+          </a:xfrm>
+        </p:spPr>
+        <p:txBody>
+          <a:bodyPr>
+            <a:normAutofit fontScale="90000"/>
+          </a:bodyPr>
+          <a:lstStyle/>
+          <a:p>
+            <a:r>
+              <a:rPr lang="en-US" dirty="0" smtClean="0"/>
+              <a:t>Spring boot </a:t>
+            </a:r>
+            <a:r>
+              <a:rPr lang="en-US" dirty="0" err="1" smtClean="0"/>
+              <a:t>primeros</a:t>
+            </a:r>
+            <a:r>
+              <a:rPr lang="en-US" dirty="0" smtClean="0"/>
+              <a:t> </a:t>
+            </a:r>
+            <a:r>
+              <a:rPr lang="en-US" dirty="0" err="1" smtClean="0"/>
+              <a:t>pasos</a:t>
+            </a:r>
+            <a:endParaRPr lang="en-US" dirty="0"/>
+          </a:p>
+        </p:txBody>
+      </p:sp>
+      <p:pic>
+        <p:nvPicPr>
+          <p:cNvPr id="4" name="Imagen 3"/>
+          <p:cNvPicPr>
+            <a:picLocks noChangeAspect="1"/>
+          </p:cNvPicPr>
+          <p:nvPr/>
+        </p:nvPicPr>
+        <p:blipFill rotWithShape="1">
+          <a:blip r:embed="rId2"/>
+          <a:srcRect b="23931"/>
+          <a:stretch/>
+        </p:blipFill>
+        <p:spPr>
+          <a:xfrm>
+            <a:off x="2488750" y="1155257"/>
+            <a:ext cx="7220595" cy="5594677"/>
+          </a:xfrm>
+          <a:prstGeom prst="rect">
+            <a:avLst/>
+          </a:prstGeom>
+        </p:spPr>
+      </p:pic>
+    </p:spTree>
+    <p:extLst>
+      <p:ext uri="{BB962C8B-B14F-4D97-AF65-F5344CB8AC3E}">
+        <p14:creationId xmlns:p14="http://schemas.microsoft.com/office/powerpoint/2010/main" val="3406918157"/>
+      </p:ext>
+    </p:extLst>
+  </p:cSld>
+  <p:clrMapOvr>
+    <a:masterClrMapping/>
+  </p:clrMapOvr>
+</p:sld>
+</file>
+
+<file path=ppt/slides/slide18.xml><?xml version="1.0" encoding="utf-8"?>
+<p:sld xmlns:a="http://schemas.openxmlformats.org/drawingml/2006/main" xmlns:r="http://schemas.openxmlformats.org/officeDocument/2006/relationships" xmlns:p="http://schemas.openxmlformats.org/presentationml/2006/main">
+  <p:cSld>
+    <p:spTree>
+      <p:nvGrpSpPr>
+        <p:cNvPr id="1" name=""/>
+        <p:cNvGrpSpPr/>
+        <p:nvPr/>
+      </p:nvGrpSpPr>
+      <p:grpSpPr>
+        <a:xfrm>
+          <a:off x="0" y="0"/>
+          <a:ext cx="0" cy="0"/>
+          <a:chOff x="0" y="0"/>
+          <a:chExt cx="0" cy="0"/>
+        </a:xfrm>
+      </p:grpSpPr>
+      <p:sp>
+        <p:nvSpPr>
+          <p:cNvPr id="2" name="Título 1"/>
+          <p:cNvSpPr>
+            <a:spLocks noGrp="1"/>
+          </p:cNvSpPr>
+          <p:nvPr>
+            <p:ph type="title"/>
+          </p:nvPr>
+        </p:nvSpPr>
+        <p:spPr>
+          <a:xfrm>
+            <a:off x="945157" y="149391"/>
+            <a:ext cx="10058400" cy="905256"/>
+          </a:xfrm>
+        </p:spPr>
+        <p:txBody>
+          <a:bodyPr/>
+          <a:lstStyle/>
+          <a:p>
+            <a:r>
+              <a:rPr lang="en-US" dirty="0" smtClean="0"/>
+              <a:t>Spring boot </a:t>
+            </a:r>
+            <a:r>
+              <a:rPr lang="en-US" dirty="0" err="1" smtClean="0"/>
+              <a:t>primeros</a:t>
+            </a:r>
+            <a:r>
+              <a:rPr lang="en-US" dirty="0" smtClean="0"/>
+              <a:t> </a:t>
+            </a:r>
+            <a:r>
+              <a:rPr lang="en-US" dirty="0" err="1" smtClean="0"/>
+              <a:t>pasos</a:t>
+            </a:r>
+            <a:endParaRPr lang="en-US" dirty="0"/>
+          </a:p>
+        </p:txBody>
+      </p:sp>
+      <p:pic>
+        <p:nvPicPr>
+          <p:cNvPr id="4" name="Imagen 3"/>
+          <p:cNvPicPr>
+            <a:picLocks noChangeAspect="1"/>
+          </p:cNvPicPr>
+          <p:nvPr/>
+        </p:nvPicPr>
+        <p:blipFill>
+          <a:blip r:embed="rId2"/>
+          <a:stretch>
+            <a:fillRect/>
+          </a:stretch>
+        </p:blipFill>
+        <p:spPr>
+          <a:xfrm>
+            <a:off x="39070" y="1054647"/>
+            <a:ext cx="12119956" cy="5803353"/>
+          </a:xfrm>
+          <a:prstGeom prst="rect">
+            <a:avLst/>
+          </a:prstGeom>
+        </p:spPr>
+      </p:pic>
+    </p:spTree>
+    <p:extLst>
+      <p:ext uri="{BB962C8B-B14F-4D97-AF65-F5344CB8AC3E}">
+        <p14:creationId xmlns:p14="http://schemas.microsoft.com/office/powerpoint/2010/main" val="511193436"/>
+      </p:ext>
+    </p:extLst>
+  </p:cSld>
+  <p:clrMapOvr>
+    <a:masterClrMapping/>
+  </p:clrMapOvr>
+</p:sld>
+</file>
+
+<file path=ppt/slides/slide19.xml><?xml version="1.0" encoding="utf-8"?>
+<p:sld xmlns:a="http://schemas.openxmlformats.org/drawingml/2006/main" xmlns:r="http://schemas.openxmlformats.org/officeDocument/2006/relationships" xmlns:p="http://schemas.openxmlformats.org/presentationml/2006/main">
+  <p:cSld>
+    <p:spTree>
+      <p:nvGrpSpPr>
+        <p:cNvPr id="1" name=""/>
+        <p:cNvGrpSpPr/>
+        <p:nvPr/>
+      </p:nvGrpSpPr>
+      <p:grpSpPr>
+        <a:xfrm>
+          <a:off x="0" y="0"/>
+          <a:ext cx="0" cy="0"/>
+          <a:chOff x="0" y="0"/>
+          <a:chExt cx="0" cy="0"/>
+        </a:xfrm>
+      </p:grpSpPr>
+      <p:sp>
+        <p:nvSpPr>
+          <p:cNvPr id="2" name="Título 1"/>
+          <p:cNvSpPr>
+            <a:spLocks noGrp="1"/>
+          </p:cNvSpPr>
+          <p:nvPr>
+            <p:ph type="title"/>
+          </p:nvPr>
+        </p:nvSpPr>
         <p:spPr/>
         <p:txBody>
           <a:bodyPr/>
@@ -4820,7 +5108,163 @@
 </p:sld>
 </file>
 
-<file path=ppt/slides/slide18.xml><?xml version="1.0" encoding="utf-8"?>
+<file path=ppt/slides/slide2.xml><?xml version="1.0" encoding="utf-8"?>
+<p:sld xmlns:a="http://schemas.openxmlformats.org/drawingml/2006/main" xmlns:r="http://schemas.openxmlformats.org/officeDocument/2006/relationships" xmlns:p="http://schemas.openxmlformats.org/presentationml/2006/main">
+  <p:cSld>
+    <p:spTree>
+      <p:nvGrpSpPr>
+        <p:cNvPr id="1" name=""/>
+        <p:cNvGrpSpPr/>
+        <p:nvPr/>
+      </p:nvGrpSpPr>
+      <p:grpSpPr>
+        <a:xfrm>
+          <a:off x="0" y="0"/>
+          <a:ext cx="0" cy="0"/>
+          <a:chOff x="0" y="0"/>
+          <a:chExt cx="0" cy="0"/>
+        </a:xfrm>
+      </p:grpSpPr>
+      <p:sp>
+        <p:nvSpPr>
+          <p:cNvPr id="2" name="Título 1"/>
+          <p:cNvSpPr>
+            <a:spLocks noGrp="1"/>
+          </p:cNvSpPr>
+          <p:nvPr>
+            <p:ph type="title"/>
+          </p:nvPr>
+        </p:nvSpPr>
+        <p:spPr/>
+        <p:txBody>
+          <a:bodyPr/>
+          <a:lstStyle/>
+          <a:p>
+            <a:r>
+              <a:rPr lang="en-US" dirty="0" err="1" smtClean="0"/>
+              <a:t>Cliente</a:t>
+            </a:r>
+            <a:r>
+              <a:rPr lang="en-US" dirty="0" smtClean="0"/>
+              <a:t> - </a:t>
+            </a:r>
+            <a:r>
+              <a:rPr lang="en-US" dirty="0" err="1" smtClean="0"/>
+              <a:t>servidor</a:t>
+            </a:r>
+            <a:endParaRPr lang="en-US" dirty="0"/>
+          </a:p>
+        </p:txBody>
+      </p:sp>
+      <p:pic>
+        <p:nvPicPr>
+          <p:cNvPr id="4" name="Imagen 3"/>
+          <p:cNvPicPr>
+            <a:picLocks noChangeAspect="1"/>
+          </p:cNvPicPr>
+          <p:nvPr/>
+        </p:nvPicPr>
+        <p:blipFill>
+          <a:blip r:embed="rId2"/>
+          <a:stretch>
+            <a:fillRect/>
+          </a:stretch>
+        </p:blipFill>
+        <p:spPr>
+          <a:xfrm>
+            <a:off x="2569342" y="1911927"/>
+            <a:ext cx="7570534" cy="4319848"/>
+          </a:xfrm>
+          <a:prstGeom prst="rect">
+            <a:avLst/>
+          </a:prstGeom>
+        </p:spPr>
+      </p:pic>
+      <p:sp>
+        <p:nvSpPr>
+          <p:cNvPr id="5" name="CuadroTexto 4"/>
+          <p:cNvSpPr txBox="1"/>
+          <p:nvPr/>
+        </p:nvSpPr>
+        <p:spPr>
+          <a:xfrm>
+            <a:off x="349135" y="5411585"/>
+            <a:ext cx="2676698" cy="1200329"/>
+          </a:xfrm>
+          <a:prstGeom prst="rect">
+            <a:avLst/>
+          </a:prstGeom>
+          <a:noFill/>
+        </p:spPr>
+        <p:txBody>
+          <a:bodyPr wrap="square" rtlCol="0">
+            <a:spAutoFit/>
+          </a:bodyPr>
+          <a:lstStyle/>
+          <a:p>
+            <a:pPr marL="285750" indent="-285750">
+              <a:buFontTx/>
+              <a:buChar char="-"/>
+            </a:pPr>
+            <a:r>
+              <a:rPr lang="en-US" dirty="0" smtClean="0"/>
+              <a:t>REST Services</a:t>
+            </a:r>
+          </a:p>
+          <a:p>
+            <a:pPr marL="742950" lvl="1" indent="-285750">
+              <a:buFontTx/>
+              <a:buChar char="-"/>
+            </a:pPr>
+            <a:r>
+              <a:rPr lang="en-US" b="1" u="sng" dirty="0" smtClean="0">
+                <a:solidFill>
+                  <a:schemeClr val="accent1">
+                    <a:lumMod val="75000"/>
+                  </a:schemeClr>
+                </a:solidFill>
+              </a:rPr>
+              <a:t>API Rest</a:t>
+            </a:r>
+          </a:p>
+          <a:p>
+            <a:pPr marL="285750" indent="-285750">
+              <a:buFontTx/>
+              <a:buChar char="-"/>
+            </a:pPr>
+            <a:r>
+              <a:rPr lang="en-US" dirty="0" err="1" smtClean="0"/>
+              <a:t>WebServices</a:t>
+            </a:r>
+            <a:endParaRPr lang="en-US" dirty="0" smtClean="0"/>
+          </a:p>
+          <a:p>
+            <a:pPr marL="742950" lvl="1" indent="-285750">
+              <a:buFontTx/>
+              <a:buChar char="-"/>
+            </a:pPr>
+            <a:r>
+              <a:rPr lang="en-US" dirty="0" smtClean="0"/>
+              <a:t>Soap</a:t>
+            </a:r>
+            <a:endParaRPr lang="en-US" dirty="0"/>
+          </a:p>
+        </p:txBody>
+      </p:sp>
+    </p:spTree>
+    <p:extLst>
+      <p:ext uri="{BB962C8B-B14F-4D97-AF65-F5344CB8AC3E}">
+        <p14:creationId xmlns:p14="http://schemas.microsoft.com/office/powerpoint/2010/main" val="2591621774"/>
+      </p:ext>
+    </p:extLst>
+  </p:cSld>
+  <p:clrMapOvr>
+    <a:masterClrMapping/>
+  </p:clrMapOvr>
+</p:sld>
+</file>
+
+<file path=ppt/slides/slide20.xml><?xml version="1.0" encoding="utf-8"?>
 <p:sld xmlns:a="http://schemas.openxmlformats.org/drawingml/2006/main" xmlns:r="http://schemas.openxmlformats.org/officeDocument/2006/relationships" xmlns:p="http://schemas.openxmlformats.org/presentationml/2006/main">
   <p:cSld>
     <p:spTree>
@@ -4914,340 +5358,6 @@
 </p:sld>
 </file>
 
-<file path=ppt/slides/slide19.xml><?xml version="1.0" encoding="utf-8"?>
-<p:sld xmlns:a="http://schemas.openxmlformats.org/drawingml/2006/main" xmlns:r="http://schemas.openxmlformats.org/officeDocument/2006/relationships" xmlns:p="http://schemas.openxmlformats.org/presentationml/2006/main">
-  <p:cSld>
-    <p:spTree>
-      <p:nvGrpSpPr>
-        <p:cNvPr id="1" name=""/>
-        <p:cNvGrpSpPr/>
-        <p:nvPr/>
-      </p:nvGrpSpPr>
-      <p:grpSpPr>
-        <a:xfrm>
-          <a:off x="0" y="0"/>
-          <a:ext cx="0" cy="0"/>
-          <a:chOff x="0" y="0"/>
-          <a:chExt cx="0" cy="0"/>
-        </a:xfrm>
-      </p:grpSpPr>
-      <p:sp>
-        <p:nvSpPr>
-          <p:cNvPr id="2" name="Título 1"/>
-          <p:cNvSpPr>
-            <a:spLocks noGrp="1"/>
-          </p:cNvSpPr>
-          <p:nvPr>
-            <p:ph type="title"/>
-          </p:nvPr>
-        </p:nvSpPr>
-        <p:spPr/>
-        <p:txBody>
-          <a:bodyPr/>
-          <a:lstStyle/>
-          <a:p>
-            <a:r>
-              <a:rPr lang="en-US" dirty="0" smtClean="0"/>
-              <a:t>Spring boot </a:t>
-            </a:r>
-            <a:r>
-              <a:rPr lang="en-US" dirty="0" err="1" smtClean="0"/>
-              <a:t>primeros</a:t>
-            </a:r>
-            <a:r>
-              <a:rPr lang="en-US" dirty="0" smtClean="0"/>
-              <a:t> </a:t>
-            </a:r>
-            <a:r>
-              <a:rPr lang="en-US" dirty="0" err="1" smtClean="0"/>
-              <a:t>pasos</a:t>
-            </a:r>
-            <a:endParaRPr lang="en-US" dirty="0"/>
-          </a:p>
-        </p:txBody>
-      </p:sp>
-      <p:pic>
-        <p:nvPicPr>
-          <p:cNvPr id="4" name="Imagen 3"/>
-          <p:cNvPicPr>
-            <a:picLocks noChangeAspect="1"/>
-          </p:cNvPicPr>
-          <p:nvPr/>
-        </p:nvPicPr>
-        <p:blipFill>
-          <a:blip r:embed="rId2"/>
-          <a:stretch>
-            <a:fillRect/>
-          </a:stretch>
-        </p:blipFill>
-        <p:spPr>
-          <a:xfrm>
-            <a:off x="1794286" y="1546399"/>
-            <a:ext cx="8609524" cy="5095238"/>
-          </a:xfrm>
-          <a:prstGeom prst="rect">
-            <a:avLst/>
-          </a:prstGeom>
-        </p:spPr>
-      </p:pic>
-    </p:spTree>
-    <p:extLst>
-      <p:ext uri="{BB962C8B-B14F-4D97-AF65-F5344CB8AC3E}">
-        <p14:creationId xmlns:p14="http://schemas.microsoft.com/office/powerpoint/2010/main" val="3934148151"/>
-      </p:ext>
-    </p:extLst>
-  </p:cSld>
-  <p:clrMapOvr>
-    <a:masterClrMapping/>
-  </p:clrMapOvr>
-</p:sld>
-</file>
-
-<file path=ppt/slides/slide2.xml><?xml version="1.0" encoding="utf-8"?>
-<p:sld xmlns:a="http://schemas.openxmlformats.org/drawingml/2006/main" xmlns:r="http://schemas.openxmlformats.org/officeDocument/2006/relationships" xmlns:p="http://schemas.openxmlformats.org/presentationml/2006/main">
-  <p:cSld>
-    <p:spTree>
-      <p:nvGrpSpPr>
-        <p:cNvPr id="1" name=""/>
-        <p:cNvGrpSpPr/>
-        <p:nvPr/>
-      </p:nvGrpSpPr>
-      <p:grpSpPr>
-        <a:xfrm>
-          <a:off x="0" y="0"/>
-          <a:ext cx="0" cy="0"/>
-          <a:chOff x="0" y="0"/>
-          <a:chExt cx="0" cy="0"/>
-        </a:xfrm>
-      </p:grpSpPr>
-      <p:sp>
-        <p:nvSpPr>
-          <p:cNvPr id="2" name="Título 1"/>
-          <p:cNvSpPr>
-            <a:spLocks noGrp="1"/>
-          </p:cNvSpPr>
-          <p:nvPr>
-            <p:ph type="title"/>
-          </p:nvPr>
-        </p:nvSpPr>
-        <p:spPr/>
-        <p:txBody>
-          <a:bodyPr/>
-          <a:lstStyle/>
-          <a:p>
-            <a:r>
-              <a:rPr lang="en-US" dirty="0" err="1" smtClean="0"/>
-              <a:t>Cliente</a:t>
-            </a:r>
-            <a:r>
-              <a:rPr lang="en-US" dirty="0" smtClean="0"/>
-              <a:t> - </a:t>
-            </a:r>
-            <a:r>
-              <a:rPr lang="en-US" dirty="0" err="1" smtClean="0"/>
-              <a:t>servidor</a:t>
-            </a:r>
-            <a:endParaRPr lang="en-US" dirty="0"/>
-          </a:p>
-        </p:txBody>
-      </p:sp>
-      <p:pic>
-        <p:nvPicPr>
-          <p:cNvPr id="4" name="Imagen 3"/>
-          <p:cNvPicPr>
-            <a:picLocks noChangeAspect="1"/>
-          </p:cNvPicPr>
-          <p:nvPr/>
-        </p:nvPicPr>
-        <p:blipFill>
-          <a:blip r:embed="rId2"/>
-          <a:stretch>
-            <a:fillRect/>
-          </a:stretch>
-        </p:blipFill>
-        <p:spPr>
-          <a:xfrm>
-            <a:off x="2569342" y="1911927"/>
-            <a:ext cx="7570534" cy="4319848"/>
-          </a:xfrm>
-          <a:prstGeom prst="rect">
-            <a:avLst/>
-          </a:prstGeom>
-        </p:spPr>
-      </p:pic>
-      <p:sp>
-        <p:nvSpPr>
-          <p:cNvPr id="5" name="CuadroTexto 4"/>
-          <p:cNvSpPr txBox="1"/>
-          <p:nvPr/>
-        </p:nvSpPr>
-        <p:spPr>
-          <a:xfrm>
-            <a:off x="349135" y="5411585"/>
-            <a:ext cx="2676698" cy="1200329"/>
-          </a:xfrm>
-          <a:prstGeom prst="rect">
-            <a:avLst/>
-          </a:prstGeom>
-          <a:noFill/>
-        </p:spPr>
-        <p:txBody>
-          <a:bodyPr wrap="square" rtlCol="0">
-            <a:spAutoFit/>
-          </a:bodyPr>
-          <a:lstStyle/>
-          <a:p>
-            <a:pPr marL="285750" indent="-285750">
-              <a:buFontTx/>
-              <a:buChar char="-"/>
-            </a:pPr>
-            <a:r>
-              <a:rPr lang="en-US" dirty="0" smtClean="0"/>
-              <a:t>REST Services</a:t>
-            </a:r>
-          </a:p>
-          <a:p>
-            <a:pPr marL="742950" lvl="1" indent="-285750">
-              <a:buFontTx/>
-              <a:buChar char="-"/>
-            </a:pPr>
-            <a:r>
-              <a:rPr lang="en-US" b="1" u="sng" dirty="0" smtClean="0">
-                <a:solidFill>
-                  <a:schemeClr val="accent1">
-                    <a:lumMod val="75000"/>
-                  </a:schemeClr>
-                </a:solidFill>
-              </a:rPr>
-              <a:t>API Rest</a:t>
-            </a:r>
-          </a:p>
-          <a:p>
-            <a:pPr marL="285750" indent="-285750">
-              <a:buFontTx/>
-              <a:buChar char="-"/>
-            </a:pPr>
-            <a:r>
-              <a:rPr lang="en-US" dirty="0" err="1" smtClean="0"/>
-              <a:t>WebServices</a:t>
-            </a:r>
-            <a:endParaRPr lang="en-US" dirty="0" smtClean="0"/>
-          </a:p>
-          <a:p>
-            <a:pPr marL="742950" lvl="1" indent="-285750">
-              <a:buFontTx/>
-              <a:buChar char="-"/>
-            </a:pPr>
-            <a:r>
-              <a:rPr lang="en-US" dirty="0" smtClean="0"/>
-              <a:t>Soap</a:t>
-            </a:r>
-            <a:endParaRPr lang="en-US" dirty="0"/>
-          </a:p>
-        </p:txBody>
-      </p:sp>
-    </p:spTree>
-    <p:extLst>
-      <p:ext uri="{BB962C8B-B14F-4D97-AF65-F5344CB8AC3E}">
-        <p14:creationId xmlns:p14="http://schemas.microsoft.com/office/powerpoint/2010/main" val="2591621774"/>
-      </p:ext>
-    </p:extLst>
-  </p:cSld>
-  <p:clrMapOvr>
-    <a:masterClrMapping/>
-  </p:clrMapOvr>
-</p:sld>
-</file>
-
-<file path=ppt/slides/slide20.xml><?xml version="1.0" encoding="utf-8"?>
-<p:sld xmlns:a="http://schemas.openxmlformats.org/drawingml/2006/main" xmlns:r="http://schemas.openxmlformats.org/officeDocument/2006/relationships" xmlns:p="http://schemas.openxmlformats.org/presentationml/2006/main">
-  <p:cSld>
-    <p:spTree>
-      <p:nvGrpSpPr>
-        <p:cNvPr id="1" name=""/>
-        <p:cNvGrpSpPr/>
-        <p:nvPr/>
-      </p:nvGrpSpPr>
-      <p:grpSpPr>
-        <a:xfrm>
-          <a:off x="0" y="0"/>
-          <a:ext cx="0" cy="0"/>
-          <a:chOff x="0" y="0"/>
-          <a:chExt cx="0" cy="0"/>
-        </a:xfrm>
-      </p:grpSpPr>
-      <p:sp>
-        <p:nvSpPr>
-          <p:cNvPr id="2" name="Título 1"/>
-          <p:cNvSpPr>
-            <a:spLocks noGrp="1"/>
-          </p:cNvSpPr>
-          <p:nvPr>
-            <p:ph type="title"/>
-          </p:nvPr>
-        </p:nvSpPr>
-        <p:spPr/>
-        <p:txBody>
-          <a:bodyPr/>
-          <a:lstStyle/>
-          <a:p>
-            <a:r>
-              <a:rPr lang="en-US" dirty="0" smtClean="0"/>
-              <a:t>Spring boot </a:t>
-            </a:r>
-            <a:r>
-              <a:rPr lang="en-US" dirty="0" err="1" smtClean="0"/>
-              <a:t>primeros</a:t>
-            </a:r>
-            <a:r>
-              <a:rPr lang="en-US" dirty="0" smtClean="0"/>
-              <a:t> </a:t>
-            </a:r>
-            <a:r>
-              <a:rPr lang="en-US" dirty="0" err="1" smtClean="0"/>
-              <a:t>pasos</a:t>
-            </a:r>
-            <a:endParaRPr lang="en-US" dirty="0"/>
-          </a:p>
-        </p:txBody>
-      </p:sp>
-      <p:pic>
-        <p:nvPicPr>
-          <p:cNvPr id="4" name="Imagen 3"/>
-          <p:cNvPicPr>
-            <a:picLocks noChangeAspect="1"/>
-          </p:cNvPicPr>
-          <p:nvPr/>
-        </p:nvPicPr>
-        <p:blipFill>
-          <a:blip r:embed="rId2"/>
-          <a:stretch>
-            <a:fillRect/>
-          </a:stretch>
-        </p:blipFill>
-        <p:spPr>
-          <a:xfrm>
-            <a:off x="2756191" y="1671173"/>
-            <a:ext cx="6685714" cy="5028571"/>
-          </a:xfrm>
-          <a:prstGeom prst="rect">
-            <a:avLst/>
-          </a:prstGeom>
-        </p:spPr>
-      </p:pic>
-    </p:spTree>
-    <p:extLst>
-      <p:ext uri="{BB962C8B-B14F-4D97-AF65-F5344CB8AC3E}">
-        <p14:creationId xmlns:p14="http://schemas.microsoft.com/office/powerpoint/2010/main" val="3599360432"/>
-      </p:ext>
-    </p:extLst>
-  </p:cSld>
-  <p:clrMapOvr>
-    <a:masterClrMapping/>
-  </p:clrMapOvr>
-</p:sld>
-</file>
-
 <file path=ppt/slides/slide21.xml><?xml version="1.0" encoding="utf-8"?>
 <p:sld xmlns:a="http://schemas.openxmlformats.org/drawingml/2006/main" xmlns:r="http://schemas.openxmlformats.org/officeDocument/2006/relationships" xmlns:p="http://schemas.openxmlformats.org/presentationml/2006/main">
   <p:cSld>
@@ -5316,8 +5426,8 @@
         </p:blipFill>
         <p:spPr>
           <a:xfrm>
-            <a:off x="2005532" y="1984057"/>
-            <a:ext cx="7781925" cy="4352925"/>
+            <a:off x="1794286" y="1546399"/>
+            <a:ext cx="8609524" cy="5095238"/>
           </a:xfrm>
           <a:prstGeom prst="rect">
             <a:avLst/>
@@ -5327,7 +5437,7 @@
     </p:spTree>
     <p:extLst>
       <p:ext uri="{BB962C8B-B14F-4D97-AF65-F5344CB8AC3E}">
-        <p14:creationId xmlns:p14="http://schemas.microsoft.com/office/powerpoint/2010/main" val="1487457192"/>
+        <p14:creationId xmlns:p14="http://schemas.microsoft.com/office/powerpoint/2010/main" val="3934148151"/>
       </p:ext>
     </p:extLst>
   </p:cSld>
@@ -5405,32 +5515,8 @@
         </p:blipFill>
         <p:spPr>
           <a:xfrm>
-            <a:off x="974930" y="2093976"/>
-            <a:ext cx="4190476" cy="2980952"/>
-          </a:xfrm>
-          <a:prstGeom prst="rect">
-            <a:avLst/>
-          </a:prstGeom>
-        </p:spPr>
-      </p:pic>
-      <p:pic>
-        <p:nvPicPr>
-          <p:cNvPr id="5" name="Imagen 4"/>
-          <p:cNvPicPr>
-            <a:picLocks noChangeAspect="1"/>
-          </p:cNvPicPr>
-          <p:nvPr/>
-        </p:nvPicPr>
-        <p:blipFill>
-          <a:blip r:embed="rId3"/>
-          <a:stretch>
-            <a:fillRect/>
-          </a:stretch>
-        </p:blipFill>
-        <p:spPr>
-          <a:xfrm>
-            <a:off x="5823486" y="2093976"/>
-            <a:ext cx="5304762" cy="4104762"/>
+            <a:off x="2756191" y="1671173"/>
+            <a:ext cx="6685714" cy="5028571"/>
           </a:xfrm>
           <a:prstGeom prst="rect">
             <a:avLst/>
@@ -5440,7 +5526,7 @@
     </p:spTree>
     <p:extLst>
       <p:ext uri="{BB962C8B-B14F-4D97-AF65-F5344CB8AC3E}">
-        <p14:creationId xmlns:p14="http://schemas.microsoft.com/office/powerpoint/2010/main" val="1166374702"/>
+        <p14:creationId xmlns:p14="http://schemas.microsoft.com/office/powerpoint/2010/main" val="3599360432"/>
       </p:ext>
     </p:extLst>
   </p:cSld>
@@ -5477,16 +5563,9 @@
             <p:ph type="title"/>
           </p:nvPr>
         </p:nvSpPr>
-        <p:spPr>
-          <a:xfrm>
-            <a:off x="970095" y="0"/>
-            <a:ext cx="10058400" cy="720713"/>
-          </a:xfrm>
-        </p:spPr>
-        <p:txBody>
-          <a:bodyPr>
-            <a:normAutofit fontScale="90000"/>
-          </a:bodyPr>
+        <p:spPr/>
+        <p:txBody>
+          <a:bodyPr/>
           <a:lstStyle/>
           <a:p>
             <a:r>
@@ -5525,8 +5604,8 @@
         </p:blipFill>
         <p:spPr>
           <a:xfrm>
-            <a:off x="1454727" y="636941"/>
-            <a:ext cx="9335704" cy="6113084"/>
+            <a:off x="2005532" y="1984057"/>
+            <a:ext cx="7781925" cy="4352925"/>
           </a:xfrm>
           <a:prstGeom prst="rect">
             <a:avLst/>
@@ -5536,7 +5615,7 @@
     </p:spTree>
     <p:extLst>
       <p:ext uri="{BB962C8B-B14F-4D97-AF65-F5344CB8AC3E}">
-        <p14:creationId xmlns:p14="http://schemas.microsoft.com/office/powerpoint/2010/main" val="728484581"/>
+        <p14:creationId xmlns:p14="http://schemas.microsoft.com/office/powerpoint/2010/main" val="1487457192"/>
       </p:ext>
     </p:extLst>
   </p:cSld>
@@ -5573,6 +5652,215 @@
             <p:ph type="title"/>
           </p:nvPr>
         </p:nvSpPr>
+        <p:spPr/>
+        <p:txBody>
+          <a:bodyPr/>
+          <a:lstStyle/>
+          <a:p>
+            <a:r>
+              <a:rPr lang="en-US" dirty="0" smtClean="0"/>
+              <a:t>Spring boot </a:t>
+            </a:r>
+            <a:r>
+              <a:rPr lang="en-US" dirty="0" err="1" smtClean="0"/>
+              <a:t>primeros</a:t>
+            </a:r>
+            <a:r>
+              <a:rPr lang="en-US" dirty="0" smtClean="0"/>
+              <a:t> </a:t>
+            </a:r>
+            <a:r>
+              <a:rPr lang="en-US" dirty="0" err="1" smtClean="0"/>
+              <a:t>pasos</a:t>
+            </a:r>
+            <a:endParaRPr lang="en-US" dirty="0"/>
+          </a:p>
+        </p:txBody>
+      </p:sp>
+      <p:pic>
+        <p:nvPicPr>
+          <p:cNvPr id="4" name="Imagen 3"/>
+          <p:cNvPicPr>
+            <a:picLocks noChangeAspect="1"/>
+          </p:cNvPicPr>
+          <p:nvPr/>
+        </p:nvPicPr>
+        <p:blipFill>
+          <a:blip r:embed="rId2"/>
+          <a:stretch>
+            <a:fillRect/>
+          </a:stretch>
+        </p:blipFill>
+        <p:spPr>
+          <a:xfrm>
+            <a:off x="974930" y="2093976"/>
+            <a:ext cx="4190476" cy="2980952"/>
+          </a:xfrm>
+          <a:prstGeom prst="rect">
+            <a:avLst/>
+          </a:prstGeom>
+        </p:spPr>
+      </p:pic>
+      <p:pic>
+        <p:nvPicPr>
+          <p:cNvPr id="5" name="Imagen 4"/>
+          <p:cNvPicPr>
+            <a:picLocks noChangeAspect="1"/>
+          </p:cNvPicPr>
+          <p:nvPr/>
+        </p:nvPicPr>
+        <p:blipFill>
+          <a:blip r:embed="rId3"/>
+          <a:stretch>
+            <a:fillRect/>
+          </a:stretch>
+        </p:blipFill>
+        <p:spPr>
+          <a:xfrm>
+            <a:off x="5823486" y="2093976"/>
+            <a:ext cx="5304762" cy="4104762"/>
+          </a:xfrm>
+          <a:prstGeom prst="rect">
+            <a:avLst/>
+          </a:prstGeom>
+        </p:spPr>
+      </p:pic>
+    </p:spTree>
+    <p:extLst>
+      <p:ext uri="{BB962C8B-B14F-4D97-AF65-F5344CB8AC3E}">
+        <p14:creationId xmlns:p14="http://schemas.microsoft.com/office/powerpoint/2010/main" val="1166374702"/>
+      </p:ext>
+    </p:extLst>
+  </p:cSld>
+  <p:clrMapOvr>
+    <a:masterClrMapping/>
+  </p:clrMapOvr>
+</p:sld>
+</file>
+
+<file path=ppt/slides/slide25.xml><?xml version="1.0" encoding="utf-8"?>
+<p:sld xmlns:a="http://schemas.openxmlformats.org/drawingml/2006/main" xmlns:r="http://schemas.openxmlformats.org/officeDocument/2006/relationships" xmlns:p="http://schemas.openxmlformats.org/presentationml/2006/main">
+  <p:cSld>
+    <p:spTree>
+      <p:nvGrpSpPr>
+        <p:cNvPr id="1" name=""/>
+        <p:cNvGrpSpPr/>
+        <p:nvPr/>
+      </p:nvGrpSpPr>
+      <p:grpSpPr>
+        <a:xfrm>
+          <a:off x="0" y="0"/>
+          <a:ext cx="0" cy="0"/>
+          <a:chOff x="0" y="0"/>
+          <a:chExt cx="0" cy="0"/>
+        </a:xfrm>
+      </p:grpSpPr>
+      <p:sp>
+        <p:nvSpPr>
+          <p:cNvPr id="2" name="Título 1"/>
+          <p:cNvSpPr>
+            <a:spLocks noGrp="1"/>
+          </p:cNvSpPr>
+          <p:nvPr>
+            <p:ph type="title"/>
+          </p:nvPr>
+        </p:nvSpPr>
+        <p:spPr>
+          <a:xfrm>
+            <a:off x="970095" y="0"/>
+            <a:ext cx="10058400" cy="720713"/>
+          </a:xfrm>
+        </p:spPr>
+        <p:txBody>
+          <a:bodyPr>
+            <a:normAutofit fontScale="90000"/>
+          </a:bodyPr>
+          <a:lstStyle/>
+          <a:p>
+            <a:r>
+              <a:rPr lang="en-US" dirty="0" smtClean="0"/>
+              <a:t>Spring boot </a:t>
+            </a:r>
+            <a:r>
+              <a:rPr lang="en-US" dirty="0" err="1" smtClean="0"/>
+              <a:t>primeros</a:t>
+            </a:r>
+            <a:r>
+              <a:rPr lang="en-US" dirty="0" smtClean="0"/>
+              <a:t> </a:t>
+            </a:r>
+            <a:r>
+              <a:rPr lang="en-US" dirty="0" err="1" smtClean="0"/>
+              <a:t>pasos</a:t>
+            </a:r>
+            <a:endParaRPr lang="en-US" dirty="0"/>
+          </a:p>
+        </p:txBody>
+      </p:sp>
+      <p:pic>
+        <p:nvPicPr>
+          <p:cNvPr id="4" name="Imagen 3"/>
+          <p:cNvPicPr>
+            <a:picLocks noChangeAspect="1"/>
+          </p:cNvPicPr>
+          <p:nvPr/>
+        </p:nvPicPr>
+        <p:blipFill>
+          <a:blip r:embed="rId2"/>
+          <a:stretch>
+            <a:fillRect/>
+          </a:stretch>
+        </p:blipFill>
+        <p:spPr>
+          <a:xfrm>
+            <a:off x="1454727" y="636941"/>
+            <a:ext cx="9335704" cy="6113084"/>
+          </a:xfrm>
+          <a:prstGeom prst="rect">
+            <a:avLst/>
+          </a:prstGeom>
+        </p:spPr>
+      </p:pic>
+    </p:spTree>
+    <p:extLst>
+      <p:ext uri="{BB962C8B-B14F-4D97-AF65-F5344CB8AC3E}">
+        <p14:creationId xmlns:p14="http://schemas.microsoft.com/office/powerpoint/2010/main" val="728484581"/>
+      </p:ext>
+    </p:extLst>
+  </p:cSld>
+  <p:clrMapOvr>
+    <a:masterClrMapping/>
+  </p:clrMapOvr>
+</p:sld>
+</file>
+
+<file path=ppt/slides/slide26.xml><?xml version="1.0" encoding="utf-8"?>
+<p:sld xmlns:a="http://schemas.openxmlformats.org/drawingml/2006/main" xmlns:r="http://schemas.openxmlformats.org/officeDocument/2006/relationships" xmlns:p="http://schemas.openxmlformats.org/presentationml/2006/main">
+  <p:cSld>
+    <p:spTree>
+      <p:nvGrpSpPr>
+        <p:cNvPr id="1" name=""/>
+        <p:cNvGrpSpPr/>
+        <p:nvPr/>
+      </p:nvGrpSpPr>
+      <p:grpSpPr>
+        <a:xfrm>
+          <a:off x="0" y="0"/>
+          <a:ext cx="0" cy="0"/>
+          <a:chOff x="0" y="0"/>
+          <a:chExt cx="0" cy="0"/>
+        </a:xfrm>
+      </p:grpSpPr>
+      <p:sp>
+        <p:nvSpPr>
+          <p:cNvPr id="2" name="Título 1"/>
+          <p:cNvSpPr>
+            <a:spLocks noGrp="1"/>
+          </p:cNvSpPr>
+          <p:nvPr>
+            <p:ph type="title"/>
+          </p:nvPr>
+        </p:nvSpPr>
         <p:spPr>
           <a:xfrm>
             <a:off x="1152975" y="193686"/>
@@ -5640,7 +5928,7 @@
 </p:sld>
 </file>
 
-<file path=ppt/slides/slide25.xml><?xml version="1.0" encoding="utf-8"?>
+<file path=ppt/slides/slide27.xml><?xml version="1.0" encoding="utf-8"?>
 <p:sld xmlns:a="http://schemas.openxmlformats.org/drawingml/2006/main" xmlns:r="http://schemas.openxmlformats.org/officeDocument/2006/relationships" xmlns:p="http://schemas.openxmlformats.org/presentationml/2006/main">
   <p:cSld>
     <p:spTree>

</xml_diff>

<commit_message>
java-project-template: Updated pptx file with basic git commands.
</commit_message>
<xml_diff>
--- a/resources/Spring framework.pptx
+++ b/resources/Spring framework.pptx
@@ -18,20 +18,21 @@
     <p:sldId id="266" r:id="rId12"/>
     <p:sldId id="267" r:id="rId13"/>
     <p:sldId id="268" r:id="rId14"/>
-    <p:sldId id="281" r:id="rId15"/>
-    <p:sldId id="282" r:id="rId16"/>
-    <p:sldId id="270" r:id="rId17"/>
-    <p:sldId id="269" r:id="rId18"/>
-    <p:sldId id="271" r:id="rId19"/>
-    <p:sldId id="272" r:id="rId20"/>
-    <p:sldId id="273" r:id="rId21"/>
-    <p:sldId id="274" r:id="rId22"/>
-    <p:sldId id="275" r:id="rId23"/>
-    <p:sldId id="276" r:id="rId24"/>
-    <p:sldId id="278" r:id="rId25"/>
-    <p:sldId id="279" r:id="rId26"/>
-    <p:sldId id="277" r:id="rId27"/>
-    <p:sldId id="280" r:id="rId28"/>
+    <p:sldId id="283" r:id="rId15"/>
+    <p:sldId id="281" r:id="rId16"/>
+    <p:sldId id="282" r:id="rId17"/>
+    <p:sldId id="270" r:id="rId18"/>
+    <p:sldId id="269" r:id="rId19"/>
+    <p:sldId id="271" r:id="rId20"/>
+    <p:sldId id="272" r:id="rId21"/>
+    <p:sldId id="273" r:id="rId22"/>
+    <p:sldId id="274" r:id="rId23"/>
+    <p:sldId id="275" r:id="rId24"/>
+    <p:sldId id="276" r:id="rId25"/>
+    <p:sldId id="278" r:id="rId26"/>
+    <p:sldId id="279" r:id="rId27"/>
+    <p:sldId id="277" r:id="rId28"/>
+    <p:sldId id="280" r:id="rId29"/>
   </p:sldIdLst>
   <p:sldSz cx="12192000" cy="6858000"/>
   <p:notesSz cx="6858000" cy="9144000"/>
@@ -4449,8 +4450,24 @@
           <a:lstStyle/>
           <a:p>
             <a:r>
+              <a:rPr lang="en-US" dirty="0" err="1" smtClean="0"/>
+              <a:t>Comandos</a:t>
+            </a:r>
+            <a:r>
               <a:rPr lang="en-US" dirty="0" smtClean="0"/>
-              <a:t>ESTRUCTURA DE UN PROYECTO</a:t>
+              <a:t> </a:t>
+            </a:r>
+            <a:r>
+              <a:rPr lang="en-US" dirty="0" err="1" smtClean="0"/>
+              <a:t>basicos</a:t>
+            </a:r>
+            <a:r>
+              <a:rPr lang="en-US" dirty="0" smtClean="0"/>
+              <a:t> </a:t>
+            </a:r>
+            <a:r>
+              <a:rPr lang="en-US" dirty="0" err="1" smtClean="0"/>
+              <a:t>git</a:t>
             </a:r>
             <a:endParaRPr lang="en-US" dirty="0"/>
           </a:p>
@@ -4458,32 +4475,194 @@
       </p:sp>
       <p:pic>
         <p:nvPicPr>
-          <p:cNvPr id="5" name="Imagen 4"/>
+          <p:cNvPr id="1026" name="Picture 2" descr="Resultado de imagen de Git"/>
           <p:cNvPicPr>
-            <a:picLocks noChangeAspect="1"/>
+            <a:picLocks noGrp="1" noChangeAspect="1" noChangeArrowheads="1"/>
           </p:cNvPicPr>
-          <p:nvPr/>
+          <p:nvPr>
+            <p:ph idx="1"/>
+          </p:nvPr>
         </p:nvPicPr>
         <p:blipFill>
-          <a:blip r:embed="rId2"/>
+          <a:blip r:embed="rId2">
+            <a:extLst>
+              <a:ext uri="{28A0092B-C50C-407E-A947-70E740481C1C}">
+                <a14:useLocalDpi xmlns:a14="http://schemas.microsoft.com/office/drawing/2010/main" val="0"/>
+              </a:ext>
+            </a:extLst>
+          </a:blip>
+          <a:srcRect/>
           <a:stretch>
             <a:fillRect/>
           </a:stretch>
         </p:blipFill>
-        <p:spPr>
-          <a:xfrm>
-            <a:off x="2414587" y="2093976"/>
-            <a:ext cx="6448425" cy="4276725"/>
+        <p:spPr bwMode="auto">
+          <a:xfrm>
+            <a:off x="4089400" y="1788391"/>
+            <a:ext cx="8102600" cy="4051300"/>
           </a:xfrm>
           <a:prstGeom prst="rect">
             <a:avLst/>
           </a:prstGeom>
+          <a:noFill/>
+          <a:extLst>
+            <a:ext uri="{909E8E84-426E-40DD-AFC4-6F175D3DCCD1}">
+              <a14:hiddenFill xmlns:a14="http://schemas.microsoft.com/office/drawing/2010/main">
+                <a:solidFill>
+                  <a:srgbClr val="FFFFFF"/>
+                </a:solidFill>
+              </a14:hiddenFill>
+            </a:ext>
+          </a:extLst>
         </p:spPr>
       </p:pic>
+      <p:sp>
+        <p:nvSpPr>
+          <p:cNvPr id="4" name="CuadroTexto 3"/>
+          <p:cNvSpPr txBox="1"/>
+          <p:nvPr/>
+        </p:nvSpPr>
+        <p:spPr>
+          <a:xfrm>
+            <a:off x="1069848" y="2019993"/>
+            <a:ext cx="5505519" cy="3970318"/>
+          </a:xfrm>
+          <a:prstGeom prst="rect">
+            <a:avLst/>
+          </a:prstGeom>
+          <a:noFill/>
+        </p:spPr>
+        <p:txBody>
+          <a:bodyPr wrap="square" rtlCol="0">
+            <a:spAutoFit/>
+          </a:bodyPr>
+          <a:lstStyle/>
+          <a:p>
+            <a:pPr marL="285750" indent="-285750">
+              <a:lnSpc>
+                <a:spcPct val="200000"/>
+              </a:lnSpc>
+              <a:buFont typeface="Arial" panose="020B0604020202020204" pitchFamily="34" charset="0"/>
+              <a:buChar char="•"/>
+            </a:pPr>
+            <a:r>
+              <a:rPr lang="en-US" dirty="0" err="1" smtClean="0"/>
+              <a:t>git</a:t>
+            </a:r>
+            <a:r>
+              <a:rPr lang="en-US" dirty="0" smtClean="0"/>
+              <a:t> clone</a:t>
+            </a:r>
+          </a:p>
+          <a:p>
+            <a:pPr marL="285750" indent="-285750">
+              <a:lnSpc>
+                <a:spcPct val="200000"/>
+              </a:lnSpc>
+              <a:buFont typeface="Arial" panose="020B0604020202020204" pitchFamily="34" charset="0"/>
+              <a:buChar char="•"/>
+            </a:pPr>
+            <a:r>
+              <a:rPr lang="en-US" dirty="0" err="1" smtClean="0"/>
+              <a:t>git</a:t>
+            </a:r>
+            <a:r>
+              <a:rPr lang="en-US" dirty="0" smtClean="0"/>
+              <a:t> fetch</a:t>
+            </a:r>
+          </a:p>
+          <a:p>
+            <a:pPr marL="285750" indent="-285750">
+              <a:lnSpc>
+                <a:spcPct val="200000"/>
+              </a:lnSpc>
+              <a:buFont typeface="Arial" panose="020B0604020202020204" pitchFamily="34" charset="0"/>
+              <a:buChar char="•"/>
+            </a:pPr>
+            <a:r>
+              <a:rPr lang="en-US" dirty="0" err="1" smtClean="0"/>
+              <a:t>git</a:t>
+            </a:r>
+            <a:r>
+              <a:rPr lang="en-US" dirty="0" smtClean="0"/>
+              <a:t> pull</a:t>
+            </a:r>
+          </a:p>
+          <a:p>
+            <a:pPr marL="285750" indent="-285750">
+              <a:lnSpc>
+                <a:spcPct val="200000"/>
+              </a:lnSpc>
+              <a:buFont typeface="Arial" panose="020B0604020202020204" pitchFamily="34" charset="0"/>
+              <a:buChar char="•"/>
+            </a:pPr>
+            <a:r>
+              <a:rPr lang="en-US" dirty="0" err="1" smtClean="0"/>
+              <a:t>git</a:t>
+            </a:r>
+            <a:r>
+              <a:rPr lang="en-US" dirty="0" smtClean="0"/>
+              <a:t> checkout</a:t>
+            </a:r>
+          </a:p>
+          <a:p>
+            <a:pPr marL="285750" indent="-285750">
+              <a:lnSpc>
+                <a:spcPct val="200000"/>
+              </a:lnSpc>
+              <a:buFont typeface="Arial" panose="020B0604020202020204" pitchFamily="34" charset="0"/>
+              <a:buChar char="•"/>
+            </a:pPr>
+            <a:r>
+              <a:rPr lang="en-US" dirty="0" err="1" smtClean="0"/>
+              <a:t>git</a:t>
+            </a:r>
+            <a:r>
+              <a:rPr lang="en-US" dirty="0" smtClean="0"/>
+              <a:t> add</a:t>
+            </a:r>
+          </a:p>
+          <a:p>
+            <a:pPr marL="285750" indent="-285750">
+              <a:lnSpc>
+                <a:spcPct val="200000"/>
+              </a:lnSpc>
+              <a:buFont typeface="Arial" panose="020B0604020202020204" pitchFamily="34" charset="0"/>
+              <a:buChar char="•"/>
+            </a:pPr>
+            <a:r>
+              <a:rPr lang="en-US" dirty="0" err="1" smtClean="0"/>
+              <a:t>git</a:t>
+            </a:r>
+            <a:r>
+              <a:rPr lang="en-US" dirty="0" smtClean="0"/>
+              <a:t> commit</a:t>
+            </a:r>
+          </a:p>
+          <a:p>
+            <a:pPr marL="285750" indent="-285750">
+              <a:lnSpc>
+                <a:spcPct val="200000"/>
+              </a:lnSpc>
+              <a:buFont typeface="Arial" panose="020B0604020202020204" pitchFamily="34" charset="0"/>
+              <a:buChar char="•"/>
+            </a:pPr>
+            <a:r>
+              <a:rPr lang="en-US" dirty="0" err="1" smtClean="0"/>
+              <a:t>git</a:t>
+            </a:r>
+            <a:r>
+              <a:rPr lang="en-US" dirty="0" smtClean="0"/>
+              <a:t> push</a:t>
+            </a:r>
+            <a:endParaRPr lang="en-US" dirty="0"/>
+          </a:p>
+        </p:txBody>
+      </p:sp>
     </p:spTree>
     <p:extLst>
       <p:ext uri="{BB962C8B-B14F-4D97-AF65-F5344CB8AC3E}">
-        <p14:creationId xmlns:p14="http://schemas.microsoft.com/office/powerpoint/2010/main" val="3461384825"/>
+        <p14:creationId xmlns:p14="http://schemas.microsoft.com/office/powerpoint/2010/main" val="3794866814"/>
       </p:ext>
     </p:extLst>
   </p:cSld>
@@ -4526,87 +4705,8 @@
           <a:lstStyle/>
           <a:p>
             <a:r>
-              <a:rPr lang="en-US" dirty="0" err="1" smtClean="0"/>
-              <a:t>Requisitos</a:t>
-            </a:r>
-            <a:r>
               <a:rPr lang="en-US" dirty="0" smtClean="0"/>
-              <a:t> </a:t>
-            </a:r>
-            <a:r>
-              <a:rPr lang="en-US" dirty="0" err="1" smtClean="0"/>
-              <a:t>necesarios</a:t>
-            </a:r>
-            <a:endParaRPr lang="en-US" dirty="0"/>
-          </a:p>
-        </p:txBody>
-      </p:sp>
-      <p:sp>
-        <p:nvSpPr>
-          <p:cNvPr id="3" name="Marcador de contenido 2"/>
-          <p:cNvSpPr>
-            <a:spLocks noGrp="1"/>
-          </p:cNvSpPr>
-          <p:nvPr>
-            <p:ph idx="1"/>
-          </p:nvPr>
-        </p:nvSpPr>
-        <p:spPr/>
-        <p:txBody>
-          <a:bodyPr/>
-          <a:lstStyle/>
-          <a:p>
-            <a:r>
-              <a:rPr lang="en-US" dirty="0" smtClean="0"/>
-              <a:t>Interface</a:t>
-            </a:r>
-          </a:p>
-          <a:p>
-            <a:r>
-              <a:rPr lang="en-US" dirty="0" err="1" smtClean="0"/>
-              <a:t>Clase</a:t>
-            </a:r>
-            <a:r>
-              <a:rPr lang="en-US" dirty="0" smtClean="0"/>
-              <a:t> </a:t>
-            </a:r>
-            <a:r>
-              <a:rPr lang="en-US" dirty="0" err="1" smtClean="0"/>
-              <a:t>Abstracta</a:t>
-            </a:r>
-            <a:endParaRPr lang="en-US" dirty="0" smtClean="0"/>
-          </a:p>
-          <a:p>
-            <a:r>
-              <a:rPr lang="en-US" dirty="0" err="1" smtClean="0"/>
-              <a:t>Inmutabilidad</a:t>
-            </a:r>
-            <a:endParaRPr lang="en-US" dirty="0" smtClean="0"/>
-          </a:p>
-          <a:p>
-            <a:r>
-              <a:rPr lang="en-US" dirty="0" smtClean="0"/>
-              <a:t>SOLID</a:t>
-            </a:r>
-          </a:p>
-          <a:p>
-            <a:r>
-              <a:rPr lang="en-US" dirty="0" smtClean="0"/>
-              <a:t>Dependency Injection</a:t>
-            </a:r>
-          </a:p>
-          <a:p>
-            <a:r>
-              <a:rPr lang="en-US" dirty="0" smtClean="0"/>
-              <a:t>Inverse of Control (</a:t>
-            </a:r>
-            <a:r>
-              <a:rPr lang="en-US" dirty="0" err="1" smtClean="0"/>
-              <a:t>IoC</a:t>
-            </a:r>
-            <a:r>
-              <a:rPr lang="en-US" dirty="0" smtClean="0"/>
-              <a:t>)</a:t>
+              <a:t>ESTRUCTURA DE UN PROYECTO</a:t>
             </a:r>
             <a:endParaRPr lang="en-US" dirty="0"/>
           </a:p>
@@ -4614,7 +4714,7 @@
       </p:sp>
       <p:pic>
         <p:nvPicPr>
-          <p:cNvPr id="4" name="Imagen 3"/>
+          <p:cNvPr id="5" name="Imagen 4"/>
           <p:cNvPicPr>
             <a:picLocks noChangeAspect="1"/>
           </p:cNvPicPr>
@@ -4628,56 +4728,8 @@
         </p:blipFill>
         <p:spPr>
           <a:xfrm>
-            <a:off x="5536276" y="1800289"/>
-            <a:ext cx="1909156" cy="2461021"/>
-          </a:xfrm>
-          <a:prstGeom prst="rect">
-            <a:avLst/>
-          </a:prstGeom>
-        </p:spPr>
-      </p:pic>
-      <p:pic>
-        <p:nvPicPr>
-          <p:cNvPr id="5" name="Imagen 4"/>
-          <p:cNvPicPr>
-            <a:picLocks noChangeAspect="1"/>
-          </p:cNvPicPr>
-          <p:nvPr/>
-        </p:nvPicPr>
-        <p:blipFill>
-          <a:blip r:embed="rId3"/>
-          <a:stretch>
-            <a:fillRect/>
-          </a:stretch>
-        </p:blipFill>
-        <p:spPr>
-          <a:xfrm>
-            <a:off x="7556355" y="1800289"/>
-            <a:ext cx="2128029" cy="2461021"/>
-          </a:xfrm>
-          <a:prstGeom prst="rect">
-            <a:avLst/>
-          </a:prstGeom>
-        </p:spPr>
-      </p:pic>
-      <p:pic>
-        <p:nvPicPr>
-          <p:cNvPr id="6" name="Imagen 5"/>
-          <p:cNvPicPr>
-            <a:picLocks noChangeAspect="1"/>
-          </p:cNvPicPr>
-          <p:nvPr/>
-        </p:nvPicPr>
-        <p:blipFill>
-          <a:blip r:embed="rId4"/>
-          <a:stretch>
-            <a:fillRect/>
-          </a:stretch>
-        </p:blipFill>
-        <p:spPr>
-          <a:xfrm>
-            <a:off x="9795308" y="1800290"/>
-            <a:ext cx="1643006" cy="2454730"/>
+            <a:off x="2414587" y="2093976"/>
+            <a:ext cx="6448425" cy="4276725"/>
           </a:xfrm>
           <a:prstGeom prst="rect">
             <a:avLst/>
@@ -4687,7 +4739,7 @@
     </p:spTree>
     <p:extLst>
       <p:ext uri="{BB962C8B-B14F-4D97-AF65-F5344CB8AC3E}">
-        <p14:creationId xmlns:p14="http://schemas.microsoft.com/office/powerpoint/2010/main" val="2596304299"/>
+        <p14:creationId xmlns:p14="http://schemas.microsoft.com/office/powerpoint/2010/main" val="3461384825"/>
       </p:ext>
     </p:extLst>
   </p:cSld>
@@ -4730,12 +4782,8 @@
           <a:lstStyle/>
           <a:p>
             <a:r>
-              <a:rPr lang="en-US" dirty="0" smtClean="0"/>
-              <a:t>Spring boot </a:t>
-            </a:r>
-            <a:r>
               <a:rPr lang="en-US" dirty="0" err="1" smtClean="0"/>
-              <a:t>primeros</a:t>
+              <a:t>Requisitos</a:t>
             </a:r>
             <a:r>
               <a:rPr lang="en-US" dirty="0" smtClean="0"/>
@@ -4743,7 +4791,7 @@
             </a:r>
             <a:r>
               <a:rPr lang="en-US" dirty="0" err="1" smtClean="0"/>
-              <a:t>pasos</a:t>
+              <a:t>necesarios</a:t>
             </a:r>
             <a:endParaRPr lang="en-US" dirty="0"/>
           </a:p>
@@ -4766,28 +4814,55 @@
           <a:p>
             <a:r>
               <a:rPr lang="en-US" dirty="0" smtClean="0"/>
-              <a:t>Rest </a:t>
-            </a:r>
+              <a:t>Interface</a:t>
+            </a:r>
+          </a:p>
+          <a:p>
             <a:r>
               <a:rPr lang="en-US" dirty="0" err="1" smtClean="0"/>
-              <a:t>EndPoints</a:t>
+              <a:t>Clase</a:t>
+            </a:r>
+            <a:r>
+              <a:rPr lang="en-US" dirty="0" smtClean="0"/>
+              <a:t> </a:t>
+            </a:r>
+            <a:r>
+              <a:rPr lang="en-US" dirty="0" err="1" smtClean="0"/>
+              <a:t>Abstracta</a:t>
             </a:r>
             <a:endParaRPr lang="en-US" dirty="0" smtClean="0"/>
           </a:p>
           <a:p>
             <a:r>
               <a:rPr lang="en-US" dirty="0" err="1" smtClean="0"/>
-              <a:t>Ejemplo</a:t>
-            </a:r>
+              <a:t>Inmutabilidad</a:t>
+            </a:r>
+            <a:endParaRPr lang="en-US" dirty="0" smtClean="0"/>
+          </a:p>
+          <a:p>
             <a:r>
               <a:rPr lang="en-US" dirty="0" smtClean="0"/>
-              <a:t>: Google Drive API </a:t>
-            </a:r>
-            <a:r>
-              <a:rPr lang="en-US" dirty="0">
-                <a:hlinkClick r:id="rId2"/>
-              </a:rPr>
-              <a:t>https://developers.google.com/drive/api/v3/reference</a:t>
+              <a:t>SOLID</a:t>
+            </a:r>
+          </a:p>
+          <a:p>
+            <a:r>
+              <a:rPr lang="en-US" dirty="0" smtClean="0"/>
+              <a:t>Dependency Injection</a:t>
+            </a:r>
+          </a:p>
+          <a:p>
+            <a:r>
+              <a:rPr lang="en-US" dirty="0" smtClean="0"/>
+              <a:t>Inverse of Control (</a:t>
+            </a:r>
+            <a:r>
+              <a:rPr lang="en-US" dirty="0" err="1" smtClean="0"/>
+              <a:t>IoC</a:t>
+            </a:r>
+            <a:r>
+              <a:rPr lang="en-US" dirty="0" smtClean="0"/>
+              <a:t>)</a:t>
             </a:r>
             <a:endParaRPr lang="en-US" dirty="0"/>
           </a:p>
@@ -4796,6 +4871,30 @@
       <p:pic>
         <p:nvPicPr>
           <p:cNvPr id="4" name="Imagen 3"/>
+          <p:cNvPicPr>
+            <a:picLocks noChangeAspect="1"/>
+          </p:cNvPicPr>
+          <p:nvPr/>
+        </p:nvPicPr>
+        <p:blipFill>
+          <a:blip r:embed="rId2"/>
+          <a:stretch>
+            <a:fillRect/>
+          </a:stretch>
+        </p:blipFill>
+        <p:spPr>
+          <a:xfrm>
+            <a:off x="5536276" y="1800289"/>
+            <a:ext cx="1909156" cy="2461021"/>
+          </a:xfrm>
+          <a:prstGeom prst="rect">
+            <a:avLst/>
+          </a:prstGeom>
+        </p:spPr>
+      </p:pic>
+      <p:pic>
+        <p:nvPicPr>
+          <p:cNvPr id="5" name="Imagen 4"/>
           <p:cNvPicPr>
             <a:picLocks noChangeAspect="1"/>
           </p:cNvPicPr>
@@ -4809,8 +4908,32 @@
         </p:blipFill>
         <p:spPr>
           <a:xfrm>
-            <a:off x="1382684" y="3514725"/>
-            <a:ext cx="8229600" cy="3343275"/>
+            <a:off x="7556355" y="1800289"/>
+            <a:ext cx="2128029" cy="2461021"/>
+          </a:xfrm>
+          <a:prstGeom prst="rect">
+            <a:avLst/>
+          </a:prstGeom>
+        </p:spPr>
+      </p:pic>
+      <p:pic>
+        <p:nvPicPr>
+          <p:cNvPr id="6" name="Imagen 5"/>
+          <p:cNvPicPr>
+            <a:picLocks noChangeAspect="1"/>
+          </p:cNvPicPr>
+          <p:nvPr/>
+        </p:nvPicPr>
+        <p:blipFill>
+          <a:blip r:embed="rId4"/>
+          <a:stretch>
+            <a:fillRect/>
+          </a:stretch>
+        </p:blipFill>
+        <p:spPr>
+          <a:xfrm>
+            <a:off x="9795308" y="1800290"/>
+            <a:ext cx="1643006" cy="2454730"/>
           </a:xfrm>
           <a:prstGeom prst="rect">
             <a:avLst/>
@@ -4820,7 +4943,7 @@
     </p:spTree>
     <p:extLst>
       <p:ext uri="{BB962C8B-B14F-4D97-AF65-F5344CB8AC3E}">
-        <p14:creationId xmlns:p14="http://schemas.microsoft.com/office/powerpoint/2010/main" val="1085388330"/>
+        <p14:creationId xmlns:p14="http://schemas.microsoft.com/office/powerpoint/2010/main" val="2596304299"/>
       </p:ext>
     </p:extLst>
   </p:cSld>
@@ -4857,16 +4980,9 @@
             <p:ph type="title"/>
           </p:nvPr>
         </p:nvSpPr>
-        <p:spPr>
-          <a:xfrm>
-            <a:off x="1069847" y="333128"/>
-            <a:ext cx="10058400" cy="822129"/>
-          </a:xfrm>
-        </p:spPr>
-        <p:txBody>
-          <a:bodyPr>
-            <a:normAutofit fontScale="90000"/>
-          </a:bodyPr>
+        <p:spPr/>
+        <p:txBody>
+          <a:bodyPr/>
           <a:lstStyle/>
           <a:p>
             <a:r>
@@ -4884,6 +5000,50 @@
             <a:r>
               <a:rPr lang="en-US" dirty="0" err="1" smtClean="0"/>
               <a:t>pasos</a:t>
+            </a:r>
+            <a:endParaRPr lang="en-US" dirty="0"/>
+          </a:p>
+        </p:txBody>
+      </p:sp>
+      <p:sp>
+        <p:nvSpPr>
+          <p:cNvPr id="3" name="Marcador de contenido 2"/>
+          <p:cNvSpPr>
+            <a:spLocks noGrp="1"/>
+          </p:cNvSpPr>
+          <p:nvPr>
+            <p:ph idx="1"/>
+          </p:nvPr>
+        </p:nvSpPr>
+        <p:spPr/>
+        <p:txBody>
+          <a:bodyPr/>
+          <a:lstStyle/>
+          <a:p>
+            <a:r>
+              <a:rPr lang="en-US" dirty="0" smtClean="0"/>
+              <a:t>Rest </a:t>
+            </a:r>
+            <a:r>
+              <a:rPr lang="en-US" dirty="0" err="1" smtClean="0"/>
+              <a:t>EndPoints</a:t>
+            </a:r>
+            <a:endParaRPr lang="en-US" dirty="0" smtClean="0"/>
+          </a:p>
+          <a:p>
+            <a:r>
+              <a:rPr lang="en-US" dirty="0" err="1" smtClean="0"/>
+              <a:t>Ejemplo</a:t>
+            </a:r>
+            <a:r>
+              <a:rPr lang="en-US" dirty="0" smtClean="0"/>
+              <a:t>: Google Drive API </a:t>
+            </a:r>
+            <a:r>
+              <a:rPr lang="en-US" dirty="0">
+                <a:hlinkClick r:id="rId2"/>
+              </a:rPr>
+              <a:t>https://developers.google.com/drive/api/v3/reference</a:t>
             </a:r>
             <a:endParaRPr lang="en-US" dirty="0"/>
           </a:p>
@@ -4897,15 +5057,16 @@
           </p:cNvPicPr>
           <p:nvPr/>
         </p:nvPicPr>
-        <p:blipFill rotWithShape="1">
-          <a:blip r:embed="rId2"/>
-          <a:srcRect b="23931"/>
-          <a:stretch/>
+        <p:blipFill>
+          <a:blip r:embed="rId3"/>
+          <a:stretch>
+            <a:fillRect/>
+          </a:stretch>
         </p:blipFill>
         <p:spPr>
           <a:xfrm>
-            <a:off x="2488750" y="1155257"/>
-            <a:ext cx="7220595" cy="5594677"/>
+            <a:off x="1382684" y="3514725"/>
+            <a:ext cx="8229600" cy="3343275"/>
           </a:xfrm>
           <a:prstGeom prst="rect">
             <a:avLst/>
@@ -4915,7 +5076,7 @@
     </p:spTree>
     <p:extLst>
       <p:ext uri="{BB962C8B-B14F-4D97-AF65-F5344CB8AC3E}">
-        <p14:creationId xmlns:p14="http://schemas.microsoft.com/office/powerpoint/2010/main" val="3406918157"/>
+        <p14:creationId xmlns:p14="http://schemas.microsoft.com/office/powerpoint/2010/main" val="1085388330"/>
       </p:ext>
     </p:extLst>
   </p:cSld>
@@ -4954,12 +5115,14 @@
         </p:nvSpPr>
         <p:spPr>
           <a:xfrm>
-            <a:off x="945157" y="149391"/>
-            <a:ext cx="10058400" cy="905256"/>
+            <a:off x="1069847" y="333128"/>
+            <a:ext cx="10058400" cy="822129"/>
           </a:xfrm>
         </p:spPr>
         <p:txBody>
-          <a:bodyPr/>
+          <a:bodyPr>
+            <a:normAutofit fontScale="90000"/>
+          </a:bodyPr>
           <a:lstStyle/>
           <a:p>
             <a:r>
@@ -4990,16 +5153,15 @@
           </p:cNvPicPr>
           <p:nvPr/>
         </p:nvPicPr>
-        <p:blipFill>
+        <p:blipFill rotWithShape="1">
           <a:blip r:embed="rId2"/>
-          <a:stretch>
-            <a:fillRect/>
-          </a:stretch>
+          <a:srcRect b="23931"/>
+          <a:stretch/>
         </p:blipFill>
         <p:spPr>
           <a:xfrm>
-            <a:off x="39070" y="1054647"/>
-            <a:ext cx="12119956" cy="5803353"/>
+            <a:off x="2488750" y="1155257"/>
+            <a:ext cx="7220595" cy="5594677"/>
           </a:xfrm>
           <a:prstGeom prst="rect">
             <a:avLst/>
@@ -5009,7 +5171,7 @@
     </p:spTree>
     <p:extLst>
       <p:ext uri="{BB962C8B-B14F-4D97-AF65-F5344CB8AC3E}">
-        <p14:creationId xmlns:p14="http://schemas.microsoft.com/office/powerpoint/2010/main" val="511193436"/>
+        <p14:creationId xmlns:p14="http://schemas.microsoft.com/office/powerpoint/2010/main" val="3406918157"/>
       </p:ext>
     </p:extLst>
   </p:cSld>
@@ -5046,7 +5208,12 @@
             <p:ph type="title"/>
           </p:nvPr>
         </p:nvSpPr>
-        <p:spPr/>
+        <p:spPr>
+          <a:xfrm>
+            <a:off x="945157" y="149391"/>
+            <a:ext cx="10058400" cy="905256"/>
+          </a:xfrm>
+        </p:spPr>
         <p:txBody>
           <a:bodyPr/>
           <a:lstStyle/>
@@ -5087,8 +5254,8 @@
         </p:blipFill>
         <p:spPr>
           <a:xfrm>
-            <a:off x="1370476" y="1779485"/>
-            <a:ext cx="9457143" cy="4828571"/>
+            <a:off x="39070" y="1054647"/>
+            <a:ext cx="12119956" cy="5803353"/>
           </a:xfrm>
           <a:prstGeom prst="rect">
             <a:avLst/>
@@ -5098,7 +5265,7 @@
     </p:spTree>
     <p:extLst>
       <p:ext uri="{BB962C8B-B14F-4D97-AF65-F5344CB8AC3E}">
-        <p14:creationId xmlns:p14="http://schemas.microsoft.com/office/powerpoint/2010/main" val="1427658997"/>
+        <p14:creationId xmlns:p14="http://schemas.microsoft.com/office/powerpoint/2010/main" val="511193436"/>
       </p:ext>
     </p:extLst>
   </p:cSld>
@@ -5265,6 +5432,95 @@
 </file>
 
 <file path=ppt/slides/slide20.xml><?xml version="1.0" encoding="utf-8"?>
+<p:sld xmlns:a="http://schemas.openxmlformats.org/drawingml/2006/main" xmlns:r="http://schemas.openxmlformats.org/officeDocument/2006/relationships" xmlns:p="http://schemas.openxmlformats.org/presentationml/2006/main">
+  <p:cSld>
+    <p:spTree>
+      <p:nvGrpSpPr>
+        <p:cNvPr id="1" name=""/>
+        <p:cNvGrpSpPr/>
+        <p:nvPr/>
+      </p:nvGrpSpPr>
+      <p:grpSpPr>
+        <a:xfrm>
+          <a:off x="0" y="0"/>
+          <a:ext cx="0" cy="0"/>
+          <a:chOff x="0" y="0"/>
+          <a:chExt cx="0" cy="0"/>
+        </a:xfrm>
+      </p:grpSpPr>
+      <p:sp>
+        <p:nvSpPr>
+          <p:cNvPr id="2" name="Título 1"/>
+          <p:cNvSpPr>
+            <a:spLocks noGrp="1"/>
+          </p:cNvSpPr>
+          <p:nvPr>
+            <p:ph type="title"/>
+          </p:nvPr>
+        </p:nvSpPr>
+        <p:spPr/>
+        <p:txBody>
+          <a:bodyPr/>
+          <a:lstStyle/>
+          <a:p>
+            <a:r>
+              <a:rPr lang="en-US" dirty="0" smtClean="0"/>
+              <a:t>Spring boot </a:t>
+            </a:r>
+            <a:r>
+              <a:rPr lang="en-US" dirty="0" err="1" smtClean="0"/>
+              <a:t>primeros</a:t>
+            </a:r>
+            <a:r>
+              <a:rPr lang="en-US" dirty="0" smtClean="0"/>
+              <a:t> </a:t>
+            </a:r>
+            <a:r>
+              <a:rPr lang="en-US" dirty="0" err="1" smtClean="0"/>
+              <a:t>pasos</a:t>
+            </a:r>
+            <a:endParaRPr lang="en-US" dirty="0"/>
+          </a:p>
+        </p:txBody>
+      </p:sp>
+      <p:pic>
+        <p:nvPicPr>
+          <p:cNvPr id="4" name="Imagen 3"/>
+          <p:cNvPicPr>
+            <a:picLocks noChangeAspect="1"/>
+          </p:cNvPicPr>
+          <p:nvPr/>
+        </p:nvPicPr>
+        <p:blipFill>
+          <a:blip r:embed="rId2"/>
+          <a:stretch>
+            <a:fillRect/>
+          </a:stretch>
+        </p:blipFill>
+        <p:spPr>
+          <a:xfrm>
+            <a:off x="1370476" y="1779485"/>
+            <a:ext cx="9457143" cy="4828571"/>
+          </a:xfrm>
+          <a:prstGeom prst="rect">
+            <a:avLst/>
+          </a:prstGeom>
+        </p:spPr>
+      </p:pic>
+    </p:spTree>
+    <p:extLst>
+      <p:ext uri="{BB962C8B-B14F-4D97-AF65-F5344CB8AC3E}">
+        <p14:creationId xmlns:p14="http://schemas.microsoft.com/office/powerpoint/2010/main" val="1427658997"/>
+      </p:ext>
+    </p:extLst>
+  </p:cSld>
+  <p:clrMapOvr>
+    <a:masterClrMapping/>
+  </p:clrMapOvr>
+</p:sld>
+</file>
+
+<file path=ppt/slides/slide21.xml><?xml version="1.0" encoding="utf-8"?>
 <p:sld xmlns:a="http://schemas.openxmlformats.org/drawingml/2006/main" xmlns:r="http://schemas.openxmlformats.org/officeDocument/2006/relationships" xmlns:p="http://schemas.openxmlformats.org/presentationml/2006/main">
   <p:cSld>
     <p:spTree>
@@ -5358,95 +5614,6 @@
 </p:sld>
 </file>
 
-<file path=ppt/slides/slide21.xml><?xml version="1.0" encoding="utf-8"?>
-<p:sld xmlns:a="http://schemas.openxmlformats.org/drawingml/2006/main" xmlns:r="http://schemas.openxmlformats.org/officeDocument/2006/relationships" xmlns:p="http://schemas.openxmlformats.org/presentationml/2006/main">
-  <p:cSld>
-    <p:spTree>
-      <p:nvGrpSpPr>
-        <p:cNvPr id="1" name=""/>
-        <p:cNvGrpSpPr/>
-        <p:nvPr/>
-      </p:nvGrpSpPr>
-      <p:grpSpPr>
-        <a:xfrm>
-          <a:off x="0" y="0"/>
-          <a:ext cx="0" cy="0"/>
-          <a:chOff x="0" y="0"/>
-          <a:chExt cx="0" cy="0"/>
-        </a:xfrm>
-      </p:grpSpPr>
-      <p:sp>
-        <p:nvSpPr>
-          <p:cNvPr id="2" name="Título 1"/>
-          <p:cNvSpPr>
-            <a:spLocks noGrp="1"/>
-          </p:cNvSpPr>
-          <p:nvPr>
-            <p:ph type="title"/>
-          </p:nvPr>
-        </p:nvSpPr>
-        <p:spPr/>
-        <p:txBody>
-          <a:bodyPr/>
-          <a:lstStyle/>
-          <a:p>
-            <a:r>
-              <a:rPr lang="en-US" dirty="0" smtClean="0"/>
-              <a:t>Spring boot </a:t>
-            </a:r>
-            <a:r>
-              <a:rPr lang="en-US" dirty="0" err="1" smtClean="0"/>
-              <a:t>primeros</a:t>
-            </a:r>
-            <a:r>
-              <a:rPr lang="en-US" dirty="0" smtClean="0"/>
-              <a:t> </a:t>
-            </a:r>
-            <a:r>
-              <a:rPr lang="en-US" dirty="0" err="1" smtClean="0"/>
-              <a:t>pasos</a:t>
-            </a:r>
-            <a:endParaRPr lang="en-US" dirty="0"/>
-          </a:p>
-        </p:txBody>
-      </p:sp>
-      <p:pic>
-        <p:nvPicPr>
-          <p:cNvPr id="4" name="Imagen 3"/>
-          <p:cNvPicPr>
-            <a:picLocks noChangeAspect="1"/>
-          </p:cNvPicPr>
-          <p:nvPr/>
-        </p:nvPicPr>
-        <p:blipFill>
-          <a:blip r:embed="rId2"/>
-          <a:stretch>
-            <a:fillRect/>
-          </a:stretch>
-        </p:blipFill>
-        <p:spPr>
-          <a:xfrm>
-            <a:off x="1794286" y="1546399"/>
-            <a:ext cx="8609524" cy="5095238"/>
-          </a:xfrm>
-          <a:prstGeom prst="rect">
-            <a:avLst/>
-          </a:prstGeom>
-        </p:spPr>
-      </p:pic>
-    </p:spTree>
-    <p:extLst>
-      <p:ext uri="{BB962C8B-B14F-4D97-AF65-F5344CB8AC3E}">
-        <p14:creationId xmlns:p14="http://schemas.microsoft.com/office/powerpoint/2010/main" val="3934148151"/>
-      </p:ext>
-    </p:extLst>
-  </p:cSld>
-  <p:clrMapOvr>
-    <a:masterClrMapping/>
-  </p:clrMapOvr>
-</p:sld>
-</file>
-
 <file path=ppt/slides/slide22.xml><?xml version="1.0" encoding="utf-8"?>
 <p:sld xmlns:a="http://schemas.openxmlformats.org/drawingml/2006/main" xmlns:r="http://schemas.openxmlformats.org/officeDocument/2006/relationships" xmlns:p="http://schemas.openxmlformats.org/presentationml/2006/main">
   <p:cSld>
@@ -5515,8 +5682,8 @@
         </p:blipFill>
         <p:spPr>
           <a:xfrm>
-            <a:off x="2756191" y="1671173"/>
-            <a:ext cx="6685714" cy="5028571"/>
+            <a:off x="1794286" y="1546399"/>
+            <a:ext cx="8609524" cy="5095238"/>
           </a:xfrm>
           <a:prstGeom prst="rect">
             <a:avLst/>
@@ -5526,7 +5693,7 @@
     </p:spTree>
     <p:extLst>
       <p:ext uri="{BB962C8B-B14F-4D97-AF65-F5344CB8AC3E}">
-        <p14:creationId xmlns:p14="http://schemas.microsoft.com/office/powerpoint/2010/main" val="3599360432"/>
+        <p14:creationId xmlns:p14="http://schemas.microsoft.com/office/powerpoint/2010/main" val="3934148151"/>
       </p:ext>
     </p:extLst>
   </p:cSld>
@@ -5604,8 +5771,8 @@
         </p:blipFill>
         <p:spPr>
           <a:xfrm>
-            <a:off x="2005532" y="1984057"/>
-            <a:ext cx="7781925" cy="4352925"/>
+            <a:off x="2756191" y="1671173"/>
+            <a:ext cx="6685714" cy="5028571"/>
           </a:xfrm>
           <a:prstGeom prst="rect">
             <a:avLst/>
@@ -5615,7 +5782,7 @@
     </p:spTree>
     <p:extLst>
       <p:ext uri="{BB962C8B-B14F-4D97-AF65-F5344CB8AC3E}">
-        <p14:creationId xmlns:p14="http://schemas.microsoft.com/office/powerpoint/2010/main" val="1487457192"/>
+        <p14:creationId xmlns:p14="http://schemas.microsoft.com/office/powerpoint/2010/main" val="3599360432"/>
       </p:ext>
     </p:extLst>
   </p:cSld>
@@ -5693,32 +5860,8 @@
         </p:blipFill>
         <p:spPr>
           <a:xfrm>
-            <a:off x="974930" y="2093976"/>
-            <a:ext cx="4190476" cy="2980952"/>
-          </a:xfrm>
-          <a:prstGeom prst="rect">
-            <a:avLst/>
-          </a:prstGeom>
-        </p:spPr>
-      </p:pic>
-      <p:pic>
-        <p:nvPicPr>
-          <p:cNvPr id="5" name="Imagen 4"/>
-          <p:cNvPicPr>
-            <a:picLocks noChangeAspect="1"/>
-          </p:cNvPicPr>
-          <p:nvPr/>
-        </p:nvPicPr>
-        <p:blipFill>
-          <a:blip r:embed="rId3"/>
-          <a:stretch>
-            <a:fillRect/>
-          </a:stretch>
-        </p:blipFill>
-        <p:spPr>
-          <a:xfrm>
-            <a:off x="5823486" y="2093976"/>
-            <a:ext cx="5304762" cy="4104762"/>
+            <a:off x="2005532" y="1984057"/>
+            <a:ext cx="7781925" cy="4352925"/>
           </a:xfrm>
           <a:prstGeom prst="rect">
             <a:avLst/>
@@ -5728,7 +5871,7 @@
     </p:spTree>
     <p:extLst>
       <p:ext uri="{BB962C8B-B14F-4D97-AF65-F5344CB8AC3E}">
-        <p14:creationId xmlns:p14="http://schemas.microsoft.com/office/powerpoint/2010/main" val="1166374702"/>
+        <p14:creationId xmlns:p14="http://schemas.microsoft.com/office/powerpoint/2010/main" val="1487457192"/>
       </p:ext>
     </p:extLst>
   </p:cSld>
@@ -5765,16 +5908,9 @@
             <p:ph type="title"/>
           </p:nvPr>
         </p:nvSpPr>
-        <p:spPr>
-          <a:xfrm>
-            <a:off x="970095" y="0"/>
-            <a:ext cx="10058400" cy="720713"/>
-          </a:xfrm>
-        </p:spPr>
-        <p:txBody>
-          <a:bodyPr>
-            <a:normAutofit fontScale="90000"/>
-          </a:bodyPr>
+        <p:spPr/>
+        <p:txBody>
+          <a:bodyPr/>
           <a:lstStyle/>
           <a:p>
             <a:r>
@@ -5813,8 +5949,32 @@
         </p:blipFill>
         <p:spPr>
           <a:xfrm>
-            <a:off x="1454727" y="636941"/>
-            <a:ext cx="9335704" cy="6113084"/>
+            <a:off x="974930" y="2093976"/>
+            <a:ext cx="4190476" cy="2980952"/>
+          </a:xfrm>
+          <a:prstGeom prst="rect">
+            <a:avLst/>
+          </a:prstGeom>
+        </p:spPr>
+      </p:pic>
+      <p:pic>
+        <p:nvPicPr>
+          <p:cNvPr id="5" name="Imagen 4"/>
+          <p:cNvPicPr>
+            <a:picLocks noChangeAspect="1"/>
+          </p:cNvPicPr>
+          <p:nvPr/>
+        </p:nvPicPr>
+        <p:blipFill>
+          <a:blip r:embed="rId3"/>
+          <a:stretch>
+            <a:fillRect/>
+          </a:stretch>
+        </p:blipFill>
+        <p:spPr>
+          <a:xfrm>
+            <a:off x="5823486" y="2093976"/>
+            <a:ext cx="5304762" cy="4104762"/>
           </a:xfrm>
           <a:prstGeom prst="rect">
             <a:avLst/>
@@ -5824,7 +5984,7 @@
     </p:spTree>
     <p:extLst>
       <p:ext uri="{BB962C8B-B14F-4D97-AF65-F5344CB8AC3E}">
-        <p14:creationId xmlns:p14="http://schemas.microsoft.com/office/powerpoint/2010/main" val="728484581"/>
+        <p14:creationId xmlns:p14="http://schemas.microsoft.com/office/powerpoint/2010/main" val="1166374702"/>
       </p:ext>
     </p:extLst>
   </p:cSld>
@@ -5863,6 +6023,102 @@
         </p:nvSpPr>
         <p:spPr>
           <a:xfrm>
+            <a:off x="970095" y="0"/>
+            <a:ext cx="10058400" cy="720713"/>
+          </a:xfrm>
+        </p:spPr>
+        <p:txBody>
+          <a:bodyPr>
+            <a:normAutofit fontScale="90000"/>
+          </a:bodyPr>
+          <a:lstStyle/>
+          <a:p>
+            <a:r>
+              <a:rPr lang="en-US" dirty="0" smtClean="0"/>
+              <a:t>Spring boot </a:t>
+            </a:r>
+            <a:r>
+              <a:rPr lang="en-US" dirty="0" err="1" smtClean="0"/>
+              <a:t>primeros</a:t>
+            </a:r>
+            <a:r>
+              <a:rPr lang="en-US" dirty="0" smtClean="0"/>
+              <a:t> </a:t>
+            </a:r>
+            <a:r>
+              <a:rPr lang="en-US" dirty="0" err="1" smtClean="0"/>
+              <a:t>pasos</a:t>
+            </a:r>
+            <a:endParaRPr lang="en-US" dirty="0"/>
+          </a:p>
+        </p:txBody>
+      </p:sp>
+      <p:pic>
+        <p:nvPicPr>
+          <p:cNvPr id="4" name="Imagen 3"/>
+          <p:cNvPicPr>
+            <a:picLocks noChangeAspect="1"/>
+          </p:cNvPicPr>
+          <p:nvPr/>
+        </p:nvPicPr>
+        <p:blipFill>
+          <a:blip r:embed="rId2"/>
+          <a:stretch>
+            <a:fillRect/>
+          </a:stretch>
+        </p:blipFill>
+        <p:spPr>
+          <a:xfrm>
+            <a:off x="1454727" y="636941"/>
+            <a:ext cx="9335704" cy="6113084"/>
+          </a:xfrm>
+          <a:prstGeom prst="rect">
+            <a:avLst/>
+          </a:prstGeom>
+        </p:spPr>
+      </p:pic>
+    </p:spTree>
+    <p:extLst>
+      <p:ext uri="{BB962C8B-B14F-4D97-AF65-F5344CB8AC3E}">
+        <p14:creationId xmlns:p14="http://schemas.microsoft.com/office/powerpoint/2010/main" val="728484581"/>
+      </p:ext>
+    </p:extLst>
+  </p:cSld>
+  <p:clrMapOvr>
+    <a:masterClrMapping/>
+  </p:clrMapOvr>
+</p:sld>
+</file>
+
+<file path=ppt/slides/slide27.xml><?xml version="1.0" encoding="utf-8"?>
+<p:sld xmlns:a="http://schemas.openxmlformats.org/drawingml/2006/main" xmlns:r="http://schemas.openxmlformats.org/officeDocument/2006/relationships" xmlns:p="http://schemas.openxmlformats.org/presentationml/2006/main">
+  <p:cSld>
+    <p:spTree>
+      <p:nvGrpSpPr>
+        <p:cNvPr id="1" name=""/>
+        <p:cNvGrpSpPr/>
+        <p:nvPr/>
+      </p:nvGrpSpPr>
+      <p:grpSpPr>
+        <a:xfrm>
+          <a:off x="0" y="0"/>
+          <a:ext cx="0" cy="0"/>
+          <a:chOff x="0" y="0"/>
+          <a:chExt cx="0" cy="0"/>
+        </a:xfrm>
+      </p:grpSpPr>
+      <p:sp>
+        <p:nvSpPr>
+          <p:cNvPr id="2" name="Título 1"/>
+          <p:cNvSpPr>
+            <a:spLocks noGrp="1"/>
+          </p:cNvSpPr>
+          <p:nvPr>
+            <p:ph type="title"/>
+          </p:nvPr>
+        </p:nvSpPr>
+        <p:spPr>
+          <a:xfrm>
             <a:off x="1152975" y="193686"/>
             <a:ext cx="10058400" cy="862030"/>
           </a:xfrm>
@@ -5928,7 +6184,7 @@
 </p:sld>
 </file>
 
-<file path=ppt/slides/slide27.xml><?xml version="1.0" encoding="utf-8"?>
+<file path=ppt/slides/slide28.xml><?xml version="1.0" encoding="utf-8"?>
 <p:sld xmlns:a="http://schemas.openxmlformats.org/drawingml/2006/main" xmlns:r="http://schemas.openxmlformats.org/officeDocument/2006/relationships" xmlns:p="http://schemas.openxmlformats.org/presentationml/2006/main">
   <p:cSld>
     <p:spTree>

</xml_diff>